<commit_message>
Alterando o README, e excluindo diretorios existentes
</commit_message>
<xml_diff>
--- a/Artefatos/15. Arquitetura de negócio.pptx
+++ b/Artefatos/15. Arquitetura de negócio.pptx
@@ -13,6 +13,7 @@
     <p:sldId id="258" r:id="rId8"/>
     <p:sldId id="259" r:id="rId9"/>
     <p:sldId id="260" r:id="rId10"/>
+    <p:sldId id="261" r:id="rId11"/>
   </p:sldIdLst>
   <p:sldSz cy="5143500" cx="9144000"/>
   <p:notesSz cx="6858000" cy="9144000"/>
@@ -1181,7 +1182,7 @@
   <p:cSld>
     <p:spTree>
       <p:nvGrpSpPr>
-        <p:cNvPr id="97" name="Shape 97"/>
+        <p:cNvPr id="101" name="Shape 101"/>
         <p:cNvGrpSpPr/>
         <p:nvPr/>
       </p:nvGrpSpPr>
@@ -1195,7 +1196,7 @@
       </p:grpSpPr>
       <p:sp>
         <p:nvSpPr>
-          <p:cNvPr id="98" name="Google Shape;98;p4:notes"/>
+          <p:cNvPr id="102" name="Google Shape;102;p4:notes"/>
           <p:cNvSpPr/>
           <p:nvPr>
             <p:ph idx="2" type="sldImg"/>
@@ -1240,7 +1241,7 @@
       </p:sp>
       <p:sp>
         <p:nvSpPr>
-          <p:cNvPr id="99" name="Google Shape;99;p4:notes"/>
+          <p:cNvPr id="103" name="Google Shape;103;p4:notes"/>
           <p:cNvSpPr txBox="1"/>
           <p:nvPr>
             <p:ph idx="1" type="body"/>
@@ -1298,7 +1299,7 @@
   <p:cSld>
     <p:spTree>
       <p:nvGrpSpPr>
-        <p:cNvPr id="114" name="Shape 114"/>
+        <p:cNvPr id="122" name="Shape 122"/>
         <p:cNvGrpSpPr/>
         <p:nvPr/>
       </p:nvGrpSpPr>
@@ -1312,7 +1313,7 @@
       </p:grpSpPr>
       <p:sp>
         <p:nvSpPr>
-          <p:cNvPr id="115" name="Google Shape;115;p5:notes"/>
+          <p:cNvPr id="123" name="Google Shape;123;p5:notes"/>
           <p:cNvSpPr/>
           <p:nvPr>
             <p:ph idx="2" type="sldImg"/>
@@ -1357,7 +1358,124 @@
       </p:sp>
       <p:sp>
         <p:nvSpPr>
-          <p:cNvPr id="116" name="Google Shape;116;p5:notes"/>
+          <p:cNvPr id="124" name="Google Shape;124;p5:notes"/>
+          <p:cNvSpPr txBox="1"/>
+          <p:nvPr>
+            <p:ph idx="1" type="body"/>
+          </p:nvPr>
+        </p:nvSpPr>
+        <p:spPr>
+          <a:xfrm>
+            <a:off x="685800" y="4343400"/>
+            <a:ext cx="5486400" cy="4114800"/>
+          </a:xfrm>
+          <a:prstGeom prst="rect">
+            <a:avLst/>
+          </a:prstGeom>
+          <a:noFill/>
+          <a:ln>
+            <a:noFill/>
+          </a:ln>
+        </p:spPr>
+        <p:txBody>
+          <a:bodyPr anchorCtr="0" anchor="t" bIns="91425" lIns="91425" spcFirstLastPara="1" rIns="91425" wrap="square" tIns="91425">
+            <a:noAutofit/>
+          </a:bodyPr>
+          <a:lstStyle/>
+          <a:p>
+            <a:pPr indent="0" lvl="0" marL="0" rtl="0" algn="l">
+              <a:lnSpc>
+                <a:spcPct val="100000"/>
+              </a:lnSpc>
+              <a:spcBef>
+                <a:spcPts val="0"/>
+              </a:spcBef>
+              <a:spcAft>
+                <a:spcPts val="0"/>
+              </a:spcAft>
+              <a:buSzPts val="1100"/>
+              <a:buNone/>
+            </a:pPr>
+            <a:r>
+              <a:t/>
+            </a:r>
+            <a:endParaRPr/>
+          </a:p>
+        </p:txBody>
+      </p:sp>
+    </p:spTree>
+  </p:cSld>
+  <p:clrMapOvr>
+    <a:masterClrMapping/>
+  </p:clrMapOvr>
+</p:notes>
+</file>
+
+<file path=ppt/notesSlides/notesSlide6.xml><?xml version="1.0" encoding="utf-8"?>
+<p:notes xmlns:a="http://schemas.openxmlformats.org/drawingml/2006/main" xmlns:r="http://schemas.openxmlformats.org/officeDocument/2006/relationships" xmlns:mc="http://schemas.openxmlformats.org/markup-compatibility/2006" xmlns:mv="urn:schemas-microsoft-com:mac:vml" xmlns:p="http://schemas.openxmlformats.org/presentationml/2006/main" xmlns:c="http://schemas.openxmlformats.org/drawingml/2006/chart" xmlns:dgm="http://schemas.openxmlformats.org/drawingml/2006/diagram" xmlns:o="urn:schemas-microsoft-com:office:office" xmlns:v="urn:schemas-microsoft-com:vml" xmlns:pvml="urn:schemas-microsoft-com:office:powerpoint" xmlns:com="http://schemas.openxmlformats.org/drawingml/2006/compatibility" xmlns:p14="http://schemas.microsoft.com/office/powerpoint/2010/main" xmlns:p15="http://schemas.microsoft.com/office/powerpoint/2012/main" showMasterPhAnim="0" showMasterSp="0">
+  <p:cSld>
+    <p:spTree>
+      <p:nvGrpSpPr>
+        <p:cNvPr id="139" name="Shape 139"/>
+        <p:cNvGrpSpPr/>
+        <p:nvPr/>
+      </p:nvGrpSpPr>
+      <p:grpSpPr>
+        <a:xfrm>
+          <a:off x="0" y="0"/>
+          <a:ext cx="0" cy="0"/>
+          <a:chOff x="0" y="0"/>
+          <a:chExt cx="0" cy="0"/>
+        </a:xfrm>
+      </p:grpSpPr>
+      <p:sp>
+        <p:nvSpPr>
+          <p:cNvPr id="140" name="Google Shape;140;p6:notes"/>
+          <p:cNvSpPr/>
+          <p:nvPr>
+            <p:ph idx="2" type="sldImg"/>
+          </p:nvPr>
+        </p:nvSpPr>
+        <p:spPr>
+          <a:xfrm>
+            <a:off x="381300" y="685800"/>
+            <a:ext cx="6096000" cy="3429000"/>
+          </a:xfrm>
+          <a:custGeom>
+            <a:rect b="b" l="l" r="r" t="t"/>
+            <a:pathLst>
+              <a:path extrusionOk="0" h="120000" w="120000">
+                <a:moveTo>
+                  <a:pt x="0" y="0"/>
+                </a:moveTo>
+                <a:lnTo>
+                  <a:pt x="120000" y="0"/>
+                </a:lnTo>
+                <a:lnTo>
+                  <a:pt x="120000" y="120000"/>
+                </a:lnTo>
+                <a:lnTo>
+                  <a:pt x="0" y="120000"/>
+                </a:lnTo>
+                <a:close/>
+              </a:path>
+            </a:pathLst>
+          </a:custGeom>
+          <a:noFill/>
+          <a:ln cap="flat" cmpd="sng" w="9525">
+            <a:solidFill>
+              <a:srgbClr val="000000"/>
+            </a:solidFill>
+            <a:prstDash val="solid"/>
+            <a:round/>
+            <a:headEnd len="sm" w="sm" type="none"/>
+            <a:tailEnd len="sm" w="sm" type="none"/>
+          </a:ln>
+        </p:spPr>
+      </p:sp>
+      <p:sp>
+        <p:nvSpPr>
+          <p:cNvPr id="141" name="Google Shape;141;p6:notes"/>
           <p:cNvSpPr txBox="1"/>
           <p:nvPr>
             <p:ph idx="1" type="body"/>
@@ -9078,8 +9196,8 @@
         </p:nvSpPr>
         <p:spPr>
           <a:xfrm>
-            <a:off x="3532075" y="37300"/>
-            <a:ext cx="1704175" cy="1100150"/>
+            <a:off x="3433075" y="76200"/>
+            <a:ext cx="2054600" cy="1168500"/>
           </a:xfrm>
           <a:prstGeom prst="flowChartPunchedTape">
             <a:avLst/>
@@ -9143,7 +9261,7 @@
         </p:nvSpPr>
         <p:spPr>
           <a:xfrm>
-            <a:off x="3485063" y="248125"/>
+            <a:off x="3561263" y="351175"/>
             <a:ext cx="1798200" cy="345000"/>
           </a:xfrm>
           <a:prstGeom prst="rect">
@@ -9399,7 +9517,7 @@
         </p:nvSpPr>
         <p:spPr>
           <a:xfrm>
-            <a:off x="3782250" y="1987500"/>
+            <a:off x="3433075" y="2018150"/>
             <a:ext cx="3559800" cy="1168500"/>
           </a:xfrm>
           <a:prstGeom prst="rect">
@@ -9434,8 +9552,16 @@
               <a:buChar char="❖"/>
             </a:pPr>
             <a:r>
-              <a:rPr lang="pt-BR"/>
-              <a:t>Fazer pedido de compra</a:t>
+              <a:rPr b="0" i="0" lang="pt-BR" sz="1400" u="none" cap="none" strike="noStrike">
+                <a:solidFill>
+                  <a:srgbClr val="000000"/>
+                </a:solidFill>
+                <a:latin typeface="Arial"/>
+                <a:ea typeface="Arial"/>
+                <a:cs typeface="Arial"/>
+                <a:sym typeface="Arial"/>
+              </a:rPr>
+              <a:t>Realizar compra</a:t>
             </a:r>
             <a:endParaRPr b="0" i="0" sz="1400" u="none" cap="none" strike="noStrike">
               <a:solidFill>
@@ -9466,12 +9592,16 @@
               <a:buChar char="❖"/>
             </a:pPr>
             <a:r>
-              <a:rPr lang="pt-BR">
+              <a:rPr b="0" i="0" lang="pt-BR" sz="1400" u="none" cap="none" strike="noStrike">
                 <a:solidFill>
                   <a:schemeClr val="dk1"/>
                 </a:solidFill>
+                <a:latin typeface="Arial"/>
+                <a:ea typeface="Arial"/>
+                <a:cs typeface="Arial"/>
+                <a:sym typeface="Arial"/>
               </a:rPr>
-              <a:t>Solicitar orçamento</a:t>
+              <a:t>Cancelar compra</a:t>
             </a:r>
             <a:endParaRPr b="0" i="0" sz="1400" u="none" cap="none" strike="noStrike">
               <a:solidFill>
@@ -9502,12 +9632,16 @@
               <a:buChar char="❖"/>
             </a:pPr>
             <a:r>
-              <a:rPr lang="pt-BR">
+              <a:rPr b="0" i="0" lang="pt-BR" sz="1400" u="none" cap="none" strike="noStrike">
                 <a:solidFill>
                   <a:schemeClr val="dk1"/>
                 </a:solidFill>
+                <a:latin typeface="Arial"/>
+                <a:ea typeface="Arial"/>
+                <a:cs typeface="Arial"/>
+                <a:sym typeface="Arial"/>
               </a:rPr>
-              <a:t>Cancelamento de compra</a:t>
+              <a:t>Pagar compra</a:t>
             </a:r>
             <a:endParaRPr b="0" i="0" sz="1400" u="none" cap="none" strike="noStrike">
               <a:solidFill>
@@ -9538,12 +9672,56 @@
               <a:buChar char="❖"/>
             </a:pPr>
             <a:r>
-              <a:rPr lang="pt-BR">
+              <a:rPr b="0" i="0" lang="pt-BR" sz="1400" u="none" cap="none" strike="noStrike">
                 <a:solidFill>
                   <a:schemeClr val="dk1"/>
                 </a:solidFill>
+                <a:latin typeface="Arial"/>
+                <a:ea typeface="Arial"/>
+                <a:cs typeface="Arial"/>
+                <a:sym typeface="Arial"/>
               </a:rPr>
-              <a:t>Realizar devolução</a:t>
+              <a:t>Receber produto</a:t>
+            </a:r>
+            <a:endParaRPr b="0" i="0" sz="1400" u="none" cap="none" strike="noStrike">
+              <a:solidFill>
+                <a:schemeClr val="dk1"/>
+              </a:solidFill>
+              <a:latin typeface="Arial"/>
+              <a:ea typeface="Arial"/>
+              <a:cs typeface="Arial"/>
+              <a:sym typeface="Arial"/>
+            </a:endParaRPr>
+          </a:p>
+          <a:p>
+            <a:pPr indent="-317500" lvl="0" marL="457200" marR="0" rtl="0" algn="l">
+              <a:lnSpc>
+                <a:spcPct val="100000"/>
+              </a:lnSpc>
+              <a:spcBef>
+                <a:spcPts val="0"/>
+              </a:spcBef>
+              <a:spcAft>
+                <a:spcPts val="0"/>
+              </a:spcAft>
+              <a:buClr>
+                <a:schemeClr val="dk1"/>
+              </a:buClr>
+              <a:buSzPts val="1400"/>
+              <a:buFont typeface="Arial"/>
+              <a:buChar char="❖"/>
+            </a:pPr>
+            <a:r>
+              <a:rPr b="0" i="0" lang="pt-BR" sz="1400" u="none" cap="none" strike="noStrike">
+                <a:solidFill>
+                  <a:schemeClr val="dk1"/>
+                </a:solidFill>
+                <a:latin typeface="Arial"/>
+                <a:ea typeface="Arial"/>
+                <a:cs typeface="Arial"/>
+                <a:sym typeface="Arial"/>
+              </a:rPr>
+              <a:t>Devolver compra</a:t>
             </a:r>
             <a:endParaRPr b="0" i="0" sz="1400" u="none" cap="none" strike="noStrike">
               <a:solidFill>
@@ -9654,6 +9832,11 @@
               <a:spcAft>
                 <a:spcPts val="0"/>
               </a:spcAft>
+              <a:buClr>
+                <a:srgbClr val="000000"/>
+              </a:buClr>
+              <a:buSzPts val="1400"/>
+              <a:buFont typeface="Arial"/>
               <a:buNone/>
             </a:pPr>
             <a:r>
@@ -9694,8 +9877,8 @@
             </a:solidFill>
             <a:prstDash val="solid"/>
             <a:round/>
-            <a:headEnd len="med" w="med" type="none"/>
-            <a:tailEnd len="med" w="med" type="none"/>
+            <a:headEnd len="sm" w="sm" type="none"/>
+            <a:tailEnd len="sm" w="sm" type="none"/>
           </a:ln>
         </p:spPr>
       </p:cxnSp>
@@ -9732,20 +9915,44 @@
           </a:bodyPr>
           <a:lstStyle/>
           <a:p>
-            <a:pPr indent="0" lvl="0" marL="0" rtl="0" algn="ctr">
-              <a:spcBef>
-                <a:spcPts val="0"/>
-              </a:spcBef>
-              <a:spcAft>
-                <a:spcPts val="0"/>
-              </a:spcAft>
+            <a:pPr indent="0" lvl="0" marL="0" marR="0" rtl="0" algn="ctr">
+              <a:lnSpc>
+                <a:spcPct val="100000"/>
+              </a:lnSpc>
+              <a:spcBef>
+                <a:spcPts val="0"/>
+              </a:spcBef>
+              <a:spcAft>
+                <a:spcPts val="0"/>
+              </a:spcAft>
+              <a:buClr>
+                <a:srgbClr val="000000"/>
+              </a:buClr>
+              <a:buSzPts val="1400"/>
+              <a:buFont typeface="Arial"/>
               <a:buNone/>
             </a:pPr>
             <a:r>
-              <a:rPr lang="pt-BR"/>
-              <a:t>Loja Online</a:t>
+              <a:rPr b="0" i="0" lang="pt-BR" sz="1400" u="none" cap="none" strike="noStrike">
+                <a:solidFill>
+                  <a:srgbClr val="000000"/>
+                </a:solidFill>
+                <a:latin typeface="Arial"/>
+                <a:ea typeface="Arial"/>
+                <a:cs typeface="Arial"/>
+                <a:sym typeface="Arial"/>
+              </a:rPr>
+              <a:t>Loja </a:t>
             </a:r>
-            <a:endParaRPr/>
+            <a:endParaRPr b="0" i="0" sz="1400" u="none" cap="none" strike="noStrike">
+              <a:solidFill>
+                <a:srgbClr val="000000"/>
+              </a:solidFill>
+              <a:latin typeface="Arial"/>
+              <a:ea typeface="Arial"/>
+              <a:cs typeface="Arial"/>
+              <a:sym typeface="Arial"/>
+            </a:endParaRPr>
           </a:p>
         </p:txBody>
       </p:sp>
@@ -9782,8 +9989,8 @@
         </p:nvSpPr>
         <p:spPr>
           <a:xfrm>
-            <a:off x="3411525" y="144463"/>
-            <a:ext cx="1852525" cy="800675"/>
+            <a:off x="3411525" y="134300"/>
+            <a:ext cx="2006850" cy="810850"/>
           </a:xfrm>
           <a:prstGeom prst="flowChartPunchedTape">
             <a:avLst/>
@@ -10072,12 +10279,12 @@
           <a:blip r:embed="rId3">
             <a:alphaModFix/>
           </a:blip>
-          <a:srcRect b="12375" l="0" r="9624" t="12384"/>
+          <a:srcRect b="12374" l="0" r="9624" t="12384"/>
           <a:stretch/>
         </p:blipFill>
         <p:spPr>
           <a:xfrm>
-            <a:off x="2757325" y="1440750"/>
+            <a:off x="2147725" y="1440750"/>
             <a:ext cx="802267" cy="1227900"/>
           </a:xfrm>
           <a:prstGeom prst="rect">
@@ -10098,7 +10305,7 @@
         <p:spPr>
           <a:xfrm>
             <a:off x="5211325" y="3291875"/>
-            <a:ext cx="80100" cy="683400"/>
+            <a:ext cx="80100" cy="576600"/>
           </a:xfrm>
           <a:prstGeom prst="leftBracket">
             <a:avLst>
@@ -10162,8 +10369,8 @@
         </p:nvSpPr>
         <p:spPr>
           <a:xfrm>
-            <a:off x="6977075" y="3293350"/>
-            <a:ext cx="80100" cy="683400"/>
+            <a:off x="6343500" y="3315225"/>
+            <a:ext cx="80100" cy="529800"/>
           </a:xfrm>
           <a:prstGeom prst="rightBracket">
             <a:avLst>
@@ -10227,8 +10434,8 @@
         </p:nvSpPr>
         <p:spPr>
           <a:xfrm>
-            <a:off x="3411525" y="254088"/>
-            <a:ext cx="1852500" cy="420300"/>
+            <a:off x="2853200" y="351013"/>
+            <a:ext cx="2659200" cy="529800"/>
           </a:xfrm>
           <a:prstGeom prst="rect">
             <a:avLst/>
@@ -10244,7 +10451,7 @@
           </a:bodyPr>
           <a:lstStyle/>
           <a:p>
-            <a:pPr indent="0" lvl="0" marL="0" marR="0" rtl="0" algn="ctr">
+            <a:pPr indent="0" lvl="0" marL="457200" marR="0" rtl="0" algn="ctr">
               <a:lnSpc>
                 <a:spcPct val="100000"/>
               </a:lnSpc>
@@ -10262,8 +10469,47 @@
               <a:buNone/>
             </a:pPr>
             <a:r>
-              <a:rPr lang="pt-BR"/>
-              <a:t>Fazer pedido de compra</a:t>
+              <a:rPr b="0" i="0" lang="pt-BR" sz="1400" u="none" cap="none" strike="noStrike">
+                <a:solidFill>
+                  <a:schemeClr val="dk1"/>
+                </a:solidFill>
+                <a:latin typeface="Arial"/>
+                <a:ea typeface="Arial"/>
+                <a:cs typeface="Arial"/>
+                <a:sym typeface="Arial"/>
+              </a:rPr>
+              <a:t>Realizar compra</a:t>
+            </a:r>
+            <a:endParaRPr b="0" i="0" sz="1400" u="none" cap="none" strike="noStrike">
+              <a:solidFill>
+                <a:schemeClr val="dk1"/>
+              </a:solidFill>
+              <a:latin typeface="Arial"/>
+              <a:ea typeface="Arial"/>
+              <a:cs typeface="Arial"/>
+              <a:sym typeface="Arial"/>
+            </a:endParaRPr>
+          </a:p>
+          <a:p>
+            <a:pPr indent="0" lvl="0" marL="0" marR="0" rtl="0" algn="ctr">
+              <a:lnSpc>
+                <a:spcPct val="100000"/>
+              </a:lnSpc>
+              <a:spcBef>
+                <a:spcPts val="0"/>
+              </a:spcBef>
+              <a:spcAft>
+                <a:spcPts val="0"/>
+              </a:spcAft>
+              <a:buClr>
+                <a:srgbClr val="000000"/>
+              </a:buClr>
+              <a:buSzPts val="1400"/>
+              <a:buFont typeface="Arial"/>
+              <a:buNone/>
+            </a:pPr>
+            <a:r>
+              <a:t/>
             </a:r>
             <a:endParaRPr b="0" i="0" sz="1400" u="none" cap="none" strike="noStrike">
               <a:solidFill>
@@ -10282,14 +10528,45 @@
           <p:cNvPr id="76" name="Google Shape;76;p14"/>
           <p:cNvCxnSpPr>
             <a:stCxn id="67" idx="2"/>
-            <a:endCxn id="72" idx="3"/>
+            <a:endCxn id="72" idx="0"/>
           </p:cNvCxnSpPr>
           <p:nvPr/>
         </p:nvCxnSpPr>
         <p:spPr>
           <a:xfrm rot="5400000">
-            <a:off x="3353938" y="1070720"/>
-            <a:ext cx="1189500" cy="778200"/>
+            <a:off x="3193650" y="219365"/>
+            <a:ext cx="576600" cy="1866000"/>
+          </a:xfrm>
+          <a:prstGeom prst="curvedConnector3">
+            <a:avLst>
+              <a:gd fmla="val 57039" name="adj1"/>
+            </a:avLst>
+          </a:prstGeom>
+          <a:noFill/>
+          <a:ln cap="flat" cmpd="sng" w="19050">
+            <a:solidFill>
+              <a:srgbClr val="000000"/>
+            </a:solidFill>
+            <a:prstDash val="solid"/>
+            <a:round/>
+            <a:headEnd len="sm" w="sm" type="none"/>
+            <a:tailEnd len="sm" w="sm" type="none"/>
+          </a:ln>
+        </p:spPr>
+      </p:cxnSp>
+      <p:cxnSp>
+        <p:nvCxnSpPr>
+          <p:cNvPr id="77" name="Google Shape;77;p14"/>
+          <p:cNvCxnSpPr>
+            <a:stCxn id="67" idx="2"/>
+            <a:endCxn id="73" idx="1"/>
+          </p:cNvCxnSpPr>
+          <p:nvPr/>
+        </p:nvCxnSpPr>
+        <p:spPr>
+          <a:xfrm flipH="1" rot="-5400000">
+            <a:off x="3455100" y="1823915"/>
+            <a:ext cx="2716200" cy="796500"/>
           </a:xfrm>
           <a:prstGeom prst="curvedConnector2">
             <a:avLst/>
@@ -10301,36 +10578,8 @@
             </a:solidFill>
             <a:prstDash val="solid"/>
             <a:round/>
-            <a:headEnd len="med" w="med" type="none"/>
-            <a:tailEnd len="med" w="med" type="none"/>
-          </a:ln>
-        </p:spPr>
-      </p:cxnSp>
-      <p:cxnSp>
-        <p:nvCxnSpPr>
-          <p:cNvPr id="77" name="Google Shape;77;p14"/>
-          <p:cNvCxnSpPr>
-            <a:endCxn id="73" idx="1"/>
-          </p:cNvCxnSpPr>
-          <p:nvPr/>
-        </p:nvCxnSpPr>
-        <p:spPr>
-          <a:xfrm flipH="1" rot="-5400000">
-            <a:off x="3432025" y="1854275"/>
-            <a:ext cx="2685000" cy="873600"/>
-          </a:xfrm>
-          <a:prstGeom prst="curvedConnector2">
-            <a:avLst/>
-          </a:prstGeom>
-          <a:noFill/>
-          <a:ln cap="flat" cmpd="sng" w="19050">
-            <a:solidFill>
-              <a:srgbClr val="000000"/>
-            </a:solidFill>
-            <a:prstDash val="solid"/>
-            <a:round/>
-            <a:headEnd len="med" w="med" type="none"/>
-            <a:tailEnd len="med" w="med" type="none"/>
+            <a:headEnd len="sm" w="sm" type="none"/>
+            <a:tailEnd len="sm" w="sm" type="none"/>
           </a:ln>
         </p:spPr>
       </p:cxnSp>
@@ -10342,8 +10591,8 @@
         </p:nvSpPr>
         <p:spPr>
           <a:xfrm>
-            <a:off x="5076050" y="3451375"/>
-            <a:ext cx="2444100" cy="443100"/>
+            <a:off x="5050150" y="3368075"/>
+            <a:ext cx="1293300" cy="420300"/>
           </a:xfrm>
           <a:prstGeom prst="rect">
             <a:avLst/>
@@ -10359,21 +10608,44 @@
           </a:bodyPr>
           <a:lstStyle/>
           <a:p>
-            <a:pPr indent="-317500" lvl="0" marL="457200" rtl="0" algn="l">
-              <a:spcBef>
-                <a:spcPts val="0"/>
-              </a:spcBef>
-              <a:spcAft>
-                <a:spcPts val="0"/>
-              </a:spcAft>
+            <a:pPr indent="-317500" lvl="0" marL="457200" marR="0" rtl="0" algn="l">
+              <a:lnSpc>
+                <a:spcPct val="100000"/>
+              </a:lnSpc>
+              <a:spcBef>
+                <a:spcPts val="0"/>
+              </a:spcBef>
+              <a:spcAft>
+                <a:spcPts val="0"/>
+              </a:spcAft>
+              <a:buClr>
+                <a:srgbClr val="000000"/>
+              </a:buClr>
               <a:buSzPts val="1400"/>
+              <a:buFont typeface="Arial"/>
               <a:buChar char="●"/>
             </a:pPr>
             <a:r>
-              <a:rPr lang="pt-BR"/>
-              <a:t>Solicitar pedido</a:t>
+              <a:rPr b="0" i="0" lang="pt-BR" sz="1400" u="none" cap="none" strike="noStrike">
+                <a:solidFill>
+                  <a:srgbClr val="000000"/>
+                </a:solidFill>
+                <a:latin typeface="Arial"/>
+                <a:ea typeface="Arial"/>
+                <a:cs typeface="Arial"/>
+                <a:sym typeface="Arial"/>
+              </a:rPr>
+              <a:t>Vender</a:t>
             </a:r>
-            <a:endParaRPr/>
+            <a:endParaRPr b="0" i="0" sz="1400" u="none" cap="none" strike="noStrike">
+              <a:solidFill>
+                <a:srgbClr val="000000"/>
+              </a:solidFill>
+              <a:latin typeface="Arial"/>
+              <a:ea typeface="Arial"/>
+              <a:cs typeface="Arial"/>
+              <a:sym typeface="Arial"/>
+            </a:endParaRPr>
           </a:p>
         </p:txBody>
       </p:sp>
@@ -10410,20 +10682,44 @@
           </a:bodyPr>
           <a:lstStyle/>
           <a:p>
-            <a:pPr indent="0" lvl="0" marL="0" rtl="0" algn="ctr">
-              <a:spcBef>
-                <a:spcPts val="0"/>
-              </a:spcBef>
-              <a:spcAft>
-                <a:spcPts val="0"/>
-              </a:spcAft>
+            <a:pPr indent="0" lvl="0" marL="0" marR="0" rtl="0" algn="ctr">
+              <a:lnSpc>
+                <a:spcPct val="100000"/>
+              </a:lnSpc>
+              <a:spcBef>
+                <a:spcPts val="0"/>
+              </a:spcBef>
+              <a:spcAft>
+                <a:spcPts val="0"/>
+              </a:spcAft>
+              <a:buClr>
+                <a:srgbClr val="000000"/>
+              </a:buClr>
+              <a:buSzPts val="1400"/>
+              <a:buFont typeface="Arial"/>
               <a:buNone/>
             </a:pPr>
             <a:r>
-              <a:rPr lang="pt-BR"/>
-              <a:t>Loja Online</a:t>
+              <a:rPr b="0" i="0" lang="pt-BR" sz="1400" u="none" cap="none" strike="noStrike">
+                <a:solidFill>
+                  <a:srgbClr val="000000"/>
+                </a:solidFill>
+                <a:latin typeface="Arial"/>
+                <a:ea typeface="Arial"/>
+                <a:cs typeface="Arial"/>
+                <a:sym typeface="Arial"/>
+              </a:rPr>
+              <a:t>Loja </a:t>
             </a:r>
-            <a:endParaRPr/>
+            <a:endParaRPr b="0" i="0" sz="1400" u="none" cap="none" strike="noStrike">
+              <a:solidFill>
+                <a:srgbClr val="000000"/>
+              </a:solidFill>
+              <a:latin typeface="Arial"/>
+              <a:ea typeface="Arial"/>
+              <a:cs typeface="Arial"/>
+              <a:sym typeface="Arial"/>
+            </a:endParaRPr>
           </a:p>
         </p:txBody>
       </p:sp>
@@ -10460,7 +10756,7 @@
         </p:nvSpPr>
         <p:spPr>
           <a:xfrm>
-            <a:off x="3411525" y="144463"/>
+            <a:off x="3411525" y="68263"/>
             <a:ext cx="1852525" cy="800675"/>
           </a:xfrm>
           <a:prstGeom prst="flowChartPunchedTape">
@@ -10525,7 +10821,7 @@
         </p:nvSpPr>
         <p:spPr>
           <a:xfrm>
-            <a:off x="3335325" y="333875"/>
+            <a:off x="3333238" y="342925"/>
             <a:ext cx="2009100" cy="334800"/>
           </a:xfrm>
           <a:prstGeom prst="rect">
@@ -10560,8 +10856,16 @@
               <a:buNone/>
             </a:pPr>
             <a:r>
-              <a:rPr lang="pt-BR"/>
-              <a:t>Solicitar orçamento</a:t>
+              <a:rPr b="0" i="0" lang="pt-BR" sz="1400" u="none" cap="none" strike="noStrike">
+                <a:solidFill>
+                  <a:srgbClr val="000000"/>
+                </a:solidFill>
+                <a:latin typeface="Arial"/>
+                <a:ea typeface="Arial"/>
+                <a:cs typeface="Arial"/>
+                <a:sym typeface="Arial"/>
+              </a:rPr>
+              <a:t>Cancelar compra</a:t>
             </a:r>
             <a:endParaRPr b="0" i="0" sz="1400" u="none" cap="none" strike="noStrike">
               <a:solidFill>
@@ -10583,8 +10887,8 @@
         </p:nvSpPr>
         <p:spPr>
           <a:xfrm>
-            <a:off x="241100" y="1360375"/>
-            <a:ext cx="8733300" cy="3589800"/>
+            <a:off x="241100" y="1324375"/>
+            <a:ext cx="8733300" cy="3625800"/>
           </a:xfrm>
           <a:prstGeom prst="rect">
             <a:avLst/>
@@ -10808,7 +11112,7 @@
           <a:blip r:embed="rId3">
             <a:alphaModFix/>
           </a:blip>
-          <a:srcRect b="12375" l="0" r="9624" t="12384"/>
+          <a:srcRect b="12374" l="0" r="9624" t="12384"/>
           <a:stretch/>
         </p:blipFill>
         <p:spPr>
@@ -10834,7 +11138,7 @@
         <p:spPr>
           <a:xfrm>
             <a:off x="4754125" y="3139475"/>
-            <a:ext cx="80100" cy="580500"/>
+            <a:ext cx="80100" cy="563100"/>
           </a:xfrm>
           <a:prstGeom prst="leftBracket">
             <a:avLst>
@@ -10898,8 +11202,8 @@
         </p:nvSpPr>
         <p:spPr>
           <a:xfrm>
-            <a:off x="7053175" y="3140950"/>
-            <a:ext cx="80100" cy="580500"/>
+            <a:off x="6824575" y="3140950"/>
+            <a:ext cx="80100" cy="563100"/>
           </a:xfrm>
           <a:prstGeom prst="rightBracket">
             <a:avLst>
@@ -10964,7 +11268,7 @@
         <p:spPr>
           <a:xfrm>
             <a:off x="4761475" y="3213275"/>
-            <a:ext cx="2540700" cy="580500"/>
+            <a:ext cx="2540700" cy="420300"/>
           </a:xfrm>
           <a:prstGeom prst="rect">
             <a:avLst/>
@@ -11007,7 +11311,38 @@
                 <a:cs typeface="Arial"/>
                 <a:sym typeface="Arial"/>
               </a:rPr>
-              <a:t>Escolha do produto</a:t>
+              <a:t>Cancelar compra</a:t>
+            </a:r>
+            <a:endParaRPr b="0" i="0" sz="1400" u="none" cap="none" strike="noStrike">
+              <a:solidFill>
+                <a:srgbClr val="000000"/>
+              </a:solidFill>
+              <a:latin typeface="Arial"/>
+              <a:ea typeface="Arial"/>
+              <a:cs typeface="Arial"/>
+              <a:sym typeface="Arial"/>
+            </a:endParaRPr>
+          </a:p>
+          <a:p>
+            <a:pPr indent="0" lvl="0" marL="457200" marR="0" rtl="0" algn="l">
+              <a:lnSpc>
+                <a:spcPct val="100000"/>
+              </a:lnSpc>
+              <a:spcBef>
+                <a:spcPts val="0"/>
+              </a:spcBef>
+              <a:spcAft>
+                <a:spcPts val="0"/>
+              </a:spcAft>
+              <a:buClr>
+                <a:srgbClr val="000000"/>
+              </a:buClr>
+              <a:buSzPts val="1400"/>
+              <a:buFont typeface="Arial"/>
+              <a:buNone/>
+            </a:pPr>
+            <a:r>
+              <a:t/>
             </a:r>
             <a:endParaRPr b="0" i="0" sz="1400" u="none" cap="none" strike="noStrike">
               <a:solidFill>
@@ -11026,17 +11361,19 @@
           <p:cNvPr id="94" name="Google Shape;94;p15"/>
           <p:cNvCxnSpPr>
             <a:stCxn id="84" idx="2"/>
-            <a:endCxn id="90" idx="3"/>
+            <a:endCxn id="90" idx="0"/>
           </p:cNvCxnSpPr>
           <p:nvPr/>
         </p:nvCxnSpPr>
         <p:spPr>
           <a:xfrm rot="5400000">
-            <a:off x="3359938" y="1102520"/>
-            <a:ext cx="1215300" cy="740400"/>
+            <a:off x="3434938" y="525320"/>
+            <a:ext cx="639300" cy="1166400"/>
           </a:xfrm>
-          <a:prstGeom prst="curvedConnector2">
-            <a:avLst/>
+          <a:prstGeom prst="curvedConnector3">
+            <a:avLst>
+              <a:gd fmla="val 56268" name="adj1"/>
+            </a:avLst>
           </a:prstGeom>
           <a:noFill/>
           <a:ln cap="flat" cmpd="sng" w="19050">
@@ -11045,8 +11382,8 @@
             </a:solidFill>
             <a:prstDash val="solid"/>
             <a:round/>
-            <a:headEnd len="med" w="med" type="none"/>
-            <a:tailEnd len="med" w="med" type="none"/>
+            <a:headEnd len="sm" w="sm" type="none"/>
+            <a:tailEnd len="sm" w="sm" type="none"/>
           </a:ln>
         </p:spPr>
       </p:cxnSp>
@@ -11060,7 +11397,7 @@
         </p:nvCxnSpPr>
         <p:spPr>
           <a:xfrm flipH="1" rot="-5400000">
-            <a:off x="3241075" y="1983125"/>
+            <a:off x="3241075" y="1903025"/>
             <a:ext cx="2603700" cy="437100"/>
           </a:xfrm>
           <a:prstGeom prst="curvedConnector2">
@@ -11073,8 +11410,8 @@
             </a:solidFill>
             <a:prstDash val="solid"/>
             <a:round/>
-            <a:headEnd len="med" w="med" type="none"/>
-            <a:tailEnd len="med" w="med" type="none"/>
+            <a:headEnd len="sm" w="sm" type="none"/>
+            <a:tailEnd len="sm" w="sm" type="none"/>
           </a:ln>
         </p:spPr>
       </p:cxnSp>
@@ -11111,23 +11448,164 @@
           </a:bodyPr>
           <a:lstStyle/>
           <a:p>
-            <a:pPr indent="0" lvl="0" marL="0" rtl="0" algn="ctr">
-              <a:spcBef>
-                <a:spcPts val="0"/>
-              </a:spcBef>
-              <a:spcAft>
-                <a:spcPts val="0"/>
-              </a:spcAft>
+            <a:pPr indent="0" lvl="0" marL="0" marR="0" rtl="0" algn="ctr">
+              <a:lnSpc>
+                <a:spcPct val="100000"/>
+              </a:lnSpc>
+              <a:spcBef>
+                <a:spcPts val="0"/>
+              </a:spcBef>
+              <a:spcAft>
+                <a:spcPts val="0"/>
+              </a:spcAft>
+              <a:buClr>
+                <a:srgbClr val="000000"/>
+              </a:buClr>
+              <a:buSzPts val="1400"/>
+              <a:buFont typeface="Arial"/>
               <a:buNone/>
             </a:pPr>
             <a:r>
-              <a:rPr lang="pt-BR"/>
-              <a:t>Loja Online</a:t>
+              <a:rPr b="0" i="0" lang="pt-BR" sz="1400" u="none" cap="none" strike="noStrike">
+                <a:solidFill>
+                  <a:srgbClr val="000000"/>
+                </a:solidFill>
+                <a:latin typeface="Arial"/>
+                <a:ea typeface="Arial"/>
+                <a:cs typeface="Arial"/>
+                <a:sym typeface="Arial"/>
+              </a:rPr>
+              <a:t>Loja </a:t>
             </a:r>
-            <a:endParaRPr/>
+            <a:endParaRPr b="0" i="0" sz="1400" u="none" cap="none" strike="noStrike">
+              <a:solidFill>
+                <a:srgbClr val="000000"/>
+              </a:solidFill>
+              <a:latin typeface="Arial"/>
+              <a:ea typeface="Arial"/>
+              <a:cs typeface="Arial"/>
+              <a:sym typeface="Arial"/>
+            </a:endParaRPr>
           </a:p>
         </p:txBody>
       </p:sp>
+      <p:pic>
+        <p:nvPicPr>
+          <p:cNvPr id="97" name="Google Shape;97;p15"/>
+          <p:cNvPicPr preferRelativeResize="0"/>
+          <p:nvPr/>
+        </p:nvPicPr>
+        <p:blipFill rotWithShape="1">
+          <a:blip r:embed="rId4">
+            <a:alphaModFix/>
+          </a:blip>
+          <a:srcRect b="0" l="0" r="0" t="0"/>
+          <a:stretch/>
+        </p:blipFill>
+        <p:spPr>
+          <a:xfrm>
+            <a:off x="5563275" y="1436575"/>
+            <a:ext cx="937100" cy="1304325"/>
+          </a:xfrm>
+          <a:prstGeom prst="rect">
+            <a:avLst/>
+          </a:prstGeom>
+          <a:noFill/>
+          <a:ln>
+            <a:noFill/>
+          </a:ln>
+        </p:spPr>
+      </p:pic>
+      <p:pic>
+        <p:nvPicPr>
+          <p:cNvPr id="98" name="Google Shape;98;p15"/>
+          <p:cNvPicPr preferRelativeResize="0"/>
+          <p:nvPr/>
+        </p:nvPicPr>
+        <p:blipFill>
+          <a:blip r:embed="rId5">
+            <a:alphaModFix/>
+          </a:blip>
+          <a:stretch>
+            <a:fillRect/>
+          </a:stretch>
+        </p:blipFill>
+        <p:spPr>
+          <a:xfrm>
+            <a:off x="6824575" y="1436580"/>
+            <a:ext cx="723050" cy="1304325"/>
+          </a:xfrm>
+          <a:prstGeom prst="rect">
+            <a:avLst/>
+          </a:prstGeom>
+          <a:noFill/>
+          <a:ln>
+            <a:noFill/>
+          </a:ln>
+        </p:spPr>
+      </p:pic>
+      <p:cxnSp>
+        <p:nvCxnSpPr>
+          <p:cNvPr id="99" name="Google Shape;99;p15"/>
+          <p:cNvCxnSpPr>
+            <a:stCxn id="84" idx="2"/>
+            <a:endCxn id="97" idx="0"/>
+          </p:cNvCxnSpPr>
+          <p:nvPr/>
+        </p:nvCxnSpPr>
+        <p:spPr>
+          <a:xfrm flipH="1" rot="-5400000">
+            <a:off x="4860988" y="265670"/>
+            <a:ext cx="647700" cy="1694100"/>
+          </a:xfrm>
+          <a:prstGeom prst="curvedConnector3">
+            <a:avLst>
+              <a:gd fmla="val 56181" name="adj1"/>
+            </a:avLst>
+          </a:prstGeom>
+          <a:noFill/>
+          <a:ln cap="flat" cmpd="sng" w="19050">
+            <a:solidFill>
+              <a:srgbClr val="000000"/>
+            </a:solidFill>
+            <a:prstDash val="solid"/>
+            <a:round/>
+            <a:headEnd len="med" w="med" type="none"/>
+            <a:tailEnd len="med" w="med" type="none"/>
+          </a:ln>
+        </p:spPr>
+      </p:cxnSp>
+      <p:cxnSp>
+        <p:nvCxnSpPr>
+          <p:cNvPr id="100" name="Google Shape;100;p15"/>
+          <p:cNvCxnSpPr>
+            <a:stCxn id="84" idx="2"/>
+            <a:endCxn id="98" idx="0"/>
+          </p:cNvCxnSpPr>
+          <p:nvPr/>
+        </p:nvCxnSpPr>
+        <p:spPr>
+          <a:xfrm flipH="1" rot="-5400000">
+            <a:off x="5438038" y="-311380"/>
+            <a:ext cx="647700" cy="2848200"/>
+          </a:xfrm>
+          <a:prstGeom prst="curvedConnector3">
+            <a:avLst>
+              <a:gd fmla="val 56182" name="adj1"/>
+            </a:avLst>
+          </a:prstGeom>
+          <a:noFill/>
+          <a:ln cap="flat" cmpd="sng" w="19050">
+            <a:solidFill>
+              <a:srgbClr val="000000"/>
+            </a:solidFill>
+            <a:prstDash val="solid"/>
+            <a:round/>
+            <a:headEnd len="med" w="med" type="none"/>
+            <a:tailEnd len="med" w="med" type="none"/>
+          </a:ln>
+        </p:spPr>
+      </p:cxnSp>
     </p:spTree>
   </p:cSld>
   <p:clrMapOvr>
@@ -11141,7 +11619,7 @@
   <p:cSld>
     <p:spTree>
       <p:nvGrpSpPr>
-        <p:cNvPr id="100" name="Shape 100"/>
+        <p:cNvPr id="104" name="Shape 104"/>
         <p:cNvGrpSpPr/>
         <p:nvPr/>
       </p:nvGrpSpPr>
@@ -11155,7 +11633,7 @@
       </p:grpSpPr>
       <p:sp>
         <p:nvSpPr>
-          <p:cNvPr id="101" name="Google Shape;101;p16"/>
+          <p:cNvPr id="105" name="Google Shape;105;p16"/>
           <p:cNvSpPr/>
           <p:nvPr/>
         </p:nvSpPr>
@@ -11220,13 +11698,13 @@
       </p:sp>
       <p:sp>
         <p:nvSpPr>
-          <p:cNvPr id="102" name="Google Shape;102;p16"/>
+          <p:cNvPr id="106" name="Google Shape;106;p16"/>
           <p:cNvSpPr txBox="1"/>
           <p:nvPr/>
         </p:nvSpPr>
         <p:spPr>
           <a:xfrm>
-            <a:off x="3422775" y="192150"/>
+            <a:off x="3411525" y="231163"/>
             <a:ext cx="1922100" cy="474900"/>
           </a:xfrm>
           <a:prstGeom prst="rect">
@@ -11261,8 +11739,16 @@
               <a:buNone/>
             </a:pPr>
             <a:r>
-              <a:rPr lang="pt-BR"/>
-              <a:t>Cancelamento de compra</a:t>
+              <a:rPr b="0" i="0" lang="pt-BR" sz="1400" u="none" cap="none" strike="noStrike">
+                <a:solidFill>
+                  <a:srgbClr val="000000"/>
+                </a:solidFill>
+                <a:latin typeface="Arial"/>
+                <a:ea typeface="Arial"/>
+                <a:cs typeface="Arial"/>
+                <a:sym typeface="Arial"/>
+              </a:rPr>
+              <a:t>Pagar compra</a:t>
             </a:r>
             <a:endParaRPr b="0" i="0" sz="1400" u="none" cap="none" strike="noStrike">
               <a:solidFill>
@@ -11278,7 +11764,7 @@
       </p:sp>
       <p:sp>
         <p:nvSpPr>
-          <p:cNvPr id="103" name="Google Shape;103;p16"/>
+          <p:cNvPr id="107" name="Google Shape;107;p16"/>
           <p:cNvSpPr/>
           <p:nvPr/>
         </p:nvSpPr>
@@ -11343,7 +11829,7 @@
       </p:sp>
       <p:cxnSp>
         <p:nvCxnSpPr>
-          <p:cNvPr id="104" name="Google Shape;104;p16"/>
+          <p:cNvPr id="108" name="Google Shape;108;p16"/>
           <p:cNvCxnSpPr/>
           <p:nvPr/>
         </p:nvCxnSpPr>
@@ -11369,7 +11855,7 @@
       </p:cxnSp>
       <p:sp>
         <p:nvSpPr>
-          <p:cNvPr id="105" name="Google Shape;105;p16"/>
+          <p:cNvPr id="109" name="Google Shape;109;p16"/>
           <p:cNvSpPr txBox="1"/>
           <p:nvPr/>
         </p:nvSpPr>
@@ -11435,7 +11921,7 @@
       </p:sp>
       <p:sp>
         <p:nvSpPr>
-          <p:cNvPr id="106" name="Google Shape;106;p16"/>
+          <p:cNvPr id="110" name="Google Shape;110;p16"/>
           <p:cNvSpPr txBox="1"/>
           <p:nvPr/>
         </p:nvSpPr>
@@ -11501,14 +11987,14 @@
       </p:sp>
       <p:sp>
         <p:nvSpPr>
-          <p:cNvPr id="107" name="Google Shape;107;p16"/>
+          <p:cNvPr id="111" name="Google Shape;111;p16"/>
           <p:cNvSpPr/>
           <p:nvPr/>
         </p:nvSpPr>
         <p:spPr>
           <a:xfrm>
-            <a:off x="5099125" y="3085800"/>
-            <a:ext cx="88200" cy="549300"/>
+            <a:off x="5022925" y="3085800"/>
+            <a:ext cx="88200" cy="639300"/>
           </a:xfrm>
           <a:prstGeom prst="leftBracket">
             <a:avLst>
@@ -11566,14 +12052,14 @@
       </p:sp>
       <p:sp>
         <p:nvSpPr>
-          <p:cNvPr id="108" name="Google Shape;108;p16"/>
+          <p:cNvPr id="112" name="Google Shape;112;p16"/>
           <p:cNvSpPr/>
           <p:nvPr/>
         </p:nvSpPr>
         <p:spPr>
           <a:xfrm>
-            <a:off x="7359675" y="3085800"/>
-            <a:ext cx="88200" cy="549300"/>
+            <a:off x="7283475" y="3085800"/>
+            <a:ext cx="88200" cy="639300"/>
           </a:xfrm>
           <a:prstGeom prst="rightBracket">
             <a:avLst>
@@ -11631,14 +12117,14 @@
       </p:sp>
       <p:sp>
         <p:nvSpPr>
-          <p:cNvPr id="109" name="Google Shape;109;p16"/>
+          <p:cNvPr id="113" name="Google Shape;113;p16"/>
           <p:cNvSpPr txBox="1"/>
           <p:nvPr/>
         </p:nvSpPr>
         <p:spPr>
           <a:xfrm>
-            <a:off x="5102725" y="3177875"/>
-            <a:ext cx="2750400" cy="474900"/>
+            <a:off x="5022925" y="3154800"/>
+            <a:ext cx="2653500" cy="443100"/>
           </a:xfrm>
           <a:prstGeom prst="rect">
             <a:avLst/>
@@ -11673,7 +12159,19 @@
             </a:pPr>
             <a:r>
               <a:rPr lang="pt-BR"/>
-              <a:t>Cancelar pedido</a:t>
+              <a:t>Receber </a:t>
+            </a:r>
+            <a:r>
+              <a:rPr b="0" i="0" lang="pt-BR" sz="1400" u="none" cap="none" strike="noStrike">
+                <a:solidFill>
+                  <a:srgbClr val="000000"/>
+                </a:solidFill>
+                <a:latin typeface="Arial"/>
+                <a:ea typeface="Arial"/>
+                <a:cs typeface="Arial"/>
+                <a:sym typeface="Arial"/>
+              </a:rPr>
+              <a:t>pagamento</a:t>
             </a:r>
             <a:endParaRPr b="0" i="0" sz="1400" u="none" cap="none" strike="noStrike">
               <a:solidFill>
@@ -11751,7 +12249,7 @@
       </p:sp>
       <p:pic>
         <p:nvPicPr>
-          <p:cNvPr id="110" name="Google Shape;110;p16"/>
+          <p:cNvPr id="114" name="Google Shape;114;p16"/>
           <p:cNvPicPr preferRelativeResize="0"/>
           <p:nvPr/>
         </p:nvPicPr>
@@ -11759,7 +12257,7 @@
           <a:blip r:embed="rId3">
             <a:alphaModFix/>
           </a:blip>
-          <a:srcRect b="12376" l="0" r="9624" t="12384"/>
+          <a:srcRect b="12375" l="0" r="9624" t="12384"/>
           <a:stretch/>
         </p:blipFill>
         <p:spPr>
@@ -11778,17 +12276,48 @@
       </p:pic>
       <p:cxnSp>
         <p:nvCxnSpPr>
-          <p:cNvPr id="111" name="Google Shape;111;p16"/>
+          <p:cNvPr id="115" name="Google Shape;115;p16"/>
           <p:cNvCxnSpPr>
-            <a:stCxn id="101" idx="2"/>
-            <a:endCxn id="110" idx="3"/>
+            <a:stCxn id="105" idx="2"/>
+            <a:endCxn id="114" idx="0"/>
           </p:cNvCxnSpPr>
           <p:nvPr/>
         </p:nvCxnSpPr>
         <p:spPr>
           <a:xfrm rot="5400000">
-            <a:off x="3321838" y="1064432"/>
-            <a:ext cx="1291500" cy="740400"/>
+            <a:off x="3434938" y="525332"/>
+            <a:ext cx="639300" cy="1166400"/>
+          </a:xfrm>
+          <a:prstGeom prst="curvedConnector3">
+            <a:avLst>
+              <a:gd fmla="val 56267" name="adj1"/>
+            </a:avLst>
+          </a:prstGeom>
+          <a:noFill/>
+          <a:ln cap="flat" cmpd="sng" w="19050">
+            <a:solidFill>
+              <a:srgbClr val="000000"/>
+            </a:solidFill>
+            <a:prstDash val="solid"/>
+            <a:round/>
+            <a:headEnd len="sm" w="sm" type="none"/>
+            <a:tailEnd len="sm" w="sm" type="none"/>
+          </a:ln>
+        </p:spPr>
+      </p:cxnSp>
+      <p:cxnSp>
+        <p:nvCxnSpPr>
+          <p:cNvPr id="116" name="Google Shape;116;p16"/>
+          <p:cNvCxnSpPr>
+            <a:stCxn id="105" idx="2"/>
+            <a:endCxn id="113" idx="1"/>
+          </p:cNvCxnSpPr>
+          <p:nvPr/>
+        </p:nvCxnSpPr>
+        <p:spPr>
+          <a:xfrm flipH="1" rot="-5400000">
+            <a:off x="3386638" y="1740032"/>
+            <a:ext cx="2587500" cy="685200"/>
           </a:xfrm>
           <a:prstGeom prst="curvedConnector2">
             <a:avLst/>
@@ -11800,43 +12329,14 @@
             </a:solidFill>
             <a:prstDash val="solid"/>
             <a:round/>
-            <a:headEnd len="med" w="med" type="none"/>
-            <a:tailEnd len="med" w="med" type="none"/>
-          </a:ln>
-        </p:spPr>
-      </p:cxnSp>
-      <p:cxnSp>
-        <p:nvCxnSpPr>
-          <p:cNvPr id="112" name="Google Shape;112;p16"/>
-          <p:cNvCxnSpPr>
-            <a:stCxn id="101" idx="2"/>
-            <a:endCxn id="109" idx="1"/>
-          </p:cNvCxnSpPr>
-          <p:nvPr/>
-        </p:nvCxnSpPr>
-        <p:spPr>
-          <a:xfrm flipH="1" rot="-5400000">
-            <a:off x="3407038" y="1719632"/>
-            <a:ext cx="2626500" cy="765000"/>
-          </a:xfrm>
-          <a:prstGeom prst="curvedConnector2">
-            <a:avLst/>
-          </a:prstGeom>
-          <a:noFill/>
-          <a:ln cap="flat" cmpd="sng" w="19050">
-            <a:solidFill>
-              <a:srgbClr val="000000"/>
-            </a:solidFill>
-            <a:prstDash val="solid"/>
-            <a:round/>
-            <a:headEnd len="med" w="med" type="none"/>
-            <a:tailEnd len="med" w="med" type="none"/>
+            <a:headEnd len="sm" w="sm" type="none"/>
+            <a:tailEnd len="sm" w="sm" type="none"/>
           </a:ln>
         </p:spPr>
       </p:cxnSp>
       <p:sp>
         <p:nvSpPr>
-          <p:cNvPr id="113" name="Google Shape;113;p16"/>
+          <p:cNvPr id="117" name="Google Shape;117;p16"/>
           <p:cNvSpPr/>
           <p:nvPr/>
         </p:nvSpPr>
@@ -11867,23 +12367,164 @@
           </a:bodyPr>
           <a:lstStyle/>
           <a:p>
-            <a:pPr indent="0" lvl="0" marL="0" rtl="0" algn="ctr">
-              <a:spcBef>
-                <a:spcPts val="0"/>
-              </a:spcBef>
-              <a:spcAft>
-                <a:spcPts val="0"/>
-              </a:spcAft>
+            <a:pPr indent="0" lvl="0" marL="0" marR="0" rtl="0" algn="ctr">
+              <a:lnSpc>
+                <a:spcPct val="100000"/>
+              </a:lnSpc>
+              <a:spcBef>
+                <a:spcPts val="0"/>
+              </a:spcBef>
+              <a:spcAft>
+                <a:spcPts val="0"/>
+              </a:spcAft>
+              <a:buClr>
+                <a:srgbClr val="000000"/>
+              </a:buClr>
+              <a:buSzPts val="1400"/>
+              <a:buFont typeface="Arial"/>
               <a:buNone/>
             </a:pPr>
             <a:r>
-              <a:rPr lang="pt-BR"/>
-              <a:t>Loja Online</a:t>
+              <a:rPr b="0" i="0" lang="pt-BR" sz="1400" u="none" cap="none" strike="noStrike">
+                <a:solidFill>
+                  <a:srgbClr val="000000"/>
+                </a:solidFill>
+                <a:latin typeface="Arial"/>
+                <a:ea typeface="Arial"/>
+                <a:cs typeface="Arial"/>
+                <a:sym typeface="Arial"/>
+              </a:rPr>
+              <a:t>Loja </a:t>
             </a:r>
-            <a:endParaRPr/>
+            <a:endParaRPr b="0" i="0" sz="1400" u="none" cap="none" strike="noStrike">
+              <a:solidFill>
+                <a:srgbClr val="000000"/>
+              </a:solidFill>
+              <a:latin typeface="Arial"/>
+              <a:ea typeface="Arial"/>
+              <a:cs typeface="Arial"/>
+              <a:sym typeface="Arial"/>
+            </a:endParaRPr>
           </a:p>
         </p:txBody>
       </p:sp>
+      <p:pic>
+        <p:nvPicPr>
+          <p:cNvPr id="118" name="Google Shape;118;p16"/>
+          <p:cNvPicPr preferRelativeResize="0"/>
+          <p:nvPr/>
+        </p:nvPicPr>
+        <p:blipFill rotWithShape="1">
+          <a:blip r:embed="rId4">
+            <a:alphaModFix/>
+          </a:blip>
+          <a:srcRect b="0" l="0" r="0" t="0"/>
+          <a:stretch/>
+        </p:blipFill>
+        <p:spPr>
+          <a:xfrm>
+            <a:off x="5563275" y="1436575"/>
+            <a:ext cx="937100" cy="1304325"/>
+          </a:xfrm>
+          <a:prstGeom prst="rect">
+            <a:avLst/>
+          </a:prstGeom>
+          <a:noFill/>
+          <a:ln>
+            <a:noFill/>
+          </a:ln>
+        </p:spPr>
+      </p:pic>
+      <p:pic>
+        <p:nvPicPr>
+          <p:cNvPr id="119" name="Google Shape;119;p16"/>
+          <p:cNvPicPr preferRelativeResize="0"/>
+          <p:nvPr/>
+        </p:nvPicPr>
+        <p:blipFill>
+          <a:blip r:embed="rId5">
+            <a:alphaModFix/>
+          </a:blip>
+          <a:stretch>
+            <a:fillRect/>
+          </a:stretch>
+        </p:blipFill>
+        <p:spPr>
+          <a:xfrm>
+            <a:off x="6824575" y="1436580"/>
+            <a:ext cx="723050" cy="1304325"/>
+          </a:xfrm>
+          <a:prstGeom prst="rect">
+            <a:avLst/>
+          </a:prstGeom>
+          <a:noFill/>
+          <a:ln>
+            <a:noFill/>
+          </a:ln>
+        </p:spPr>
+      </p:pic>
+      <p:cxnSp>
+        <p:nvCxnSpPr>
+          <p:cNvPr id="120" name="Google Shape;120;p16"/>
+          <p:cNvCxnSpPr>
+            <a:stCxn id="105" idx="2"/>
+            <a:endCxn id="118" idx="0"/>
+          </p:cNvCxnSpPr>
+          <p:nvPr/>
+        </p:nvCxnSpPr>
+        <p:spPr>
+          <a:xfrm flipH="1" rot="-5400000">
+            <a:off x="4860988" y="265682"/>
+            <a:ext cx="647700" cy="1694100"/>
+          </a:xfrm>
+          <a:prstGeom prst="curvedConnector3">
+            <a:avLst>
+              <a:gd fmla="val 56180" name="adj1"/>
+            </a:avLst>
+          </a:prstGeom>
+          <a:noFill/>
+          <a:ln cap="flat" cmpd="sng" w="19050">
+            <a:solidFill>
+              <a:srgbClr val="000000"/>
+            </a:solidFill>
+            <a:prstDash val="solid"/>
+            <a:round/>
+            <a:headEnd len="sm" w="sm" type="none"/>
+            <a:tailEnd len="sm" w="sm" type="none"/>
+          </a:ln>
+        </p:spPr>
+      </p:cxnSp>
+      <p:cxnSp>
+        <p:nvCxnSpPr>
+          <p:cNvPr id="121" name="Google Shape;121;p16"/>
+          <p:cNvCxnSpPr>
+            <a:stCxn id="105" idx="2"/>
+            <a:endCxn id="119" idx="0"/>
+          </p:cNvCxnSpPr>
+          <p:nvPr/>
+        </p:nvCxnSpPr>
+        <p:spPr>
+          <a:xfrm flipH="1" rot="-5400000">
+            <a:off x="5438038" y="-311368"/>
+            <a:ext cx="647700" cy="2848200"/>
+          </a:xfrm>
+          <a:prstGeom prst="curvedConnector3">
+            <a:avLst>
+              <a:gd fmla="val 56181" name="adj1"/>
+            </a:avLst>
+          </a:prstGeom>
+          <a:noFill/>
+          <a:ln cap="flat" cmpd="sng" w="19050">
+            <a:solidFill>
+              <a:srgbClr val="000000"/>
+            </a:solidFill>
+            <a:prstDash val="solid"/>
+            <a:round/>
+            <a:headEnd len="sm" w="sm" type="none"/>
+            <a:tailEnd len="sm" w="sm" type="none"/>
+          </a:ln>
+        </p:spPr>
+      </p:cxnSp>
     </p:spTree>
   </p:cSld>
   <p:clrMapOvr>
@@ -11897,7 +12538,7 @@
   <p:cSld>
     <p:spTree>
       <p:nvGrpSpPr>
-        <p:cNvPr id="117" name="Shape 117"/>
+        <p:cNvPr id="125" name="Shape 125"/>
         <p:cNvGrpSpPr/>
         <p:nvPr/>
       </p:nvGrpSpPr>
@@ -11911,7 +12552,7 @@
       </p:grpSpPr>
       <p:sp>
         <p:nvSpPr>
-          <p:cNvPr id="118" name="Google Shape;118;p17"/>
+          <p:cNvPr id="126" name="Google Shape;126;p17"/>
           <p:cNvSpPr/>
           <p:nvPr/>
         </p:nvSpPr>
@@ -11976,7 +12617,7 @@
       </p:sp>
       <p:sp>
         <p:nvSpPr>
-          <p:cNvPr id="119" name="Google Shape;119;p17"/>
+          <p:cNvPr id="127" name="Google Shape;127;p17"/>
           <p:cNvSpPr/>
           <p:nvPr/>
         </p:nvSpPr>
@@ -12041,7 +12682,7 @@
       </p:sp>
       <p:sp>
         <p:nvSpPr>
-          <p:cNvPr id="120" name="Google Shape;120;p17"/>
+          <p:cNvPr id="128" name="Google Shape;128;p17"/>
           <p:cNvSpPr txBox="1"/>
           <p:nvPr/>
         </p:nvSpPr>
@@ -12107,7 +12748,7 @@
       </p:sp>
       <p:cxnSp>
         <p:nvCxnSpPr>
-          <p:cNvPr id="121" name="Google Shape;121;p17"/>
+          <p:cNvPr id="129" name="Google Shape;129;p17"/>
           <p:cNvCxnSpPr/>
           <p:nvPr/>
         </p:nvCxnSpPr>
@@ -12133,7 +12774,7 @@
       </p:cxnSp>
       <p:sp>
         <p:nvSpPr>
-          <p:cNvPr id="122" name="Google Shape;122;p17"/>
+          <p:cNvPr id="130" name="Google Shape;130;p17"/>
           <p:cNvSpPr txBox="1"/>
           <p:nvPr/>
         </p:nvSpPr>
@@ -12239,13 +12880,13 @@
       </p:sp>
       <p:sp>
         <p:nvSpPr>
-          <p:cNvPr id="123" name="Google Shape;123;p17"/>
+          <p:cNvPr id="131" name="Google Shape;131;p17"/>
           <p:cNvSpPr txBox="1"/>
           <p:nvPr/>
         </p:nvSpPr>
         <p:spPr>
           <a:xfrm>
-            <a:off x="3225988" y="258463"/>
+            <a:off x="3225988" y="267500"/>
             <a:ext cx="2223600" cy="420300"/>
           </a:xfrm>
           <a:prstGeom prst="rect">
@@ -12280,8 +12921,16 @@
               <a:buNone/>
             </a:pPr>
             <a:r>
-              <a:rPr lang="pt-BR"/>
-              <a:t>Realizar devolução</a:t>
+              <a:rPr b="0" i="0" lang="pt-BR" sz="1400" u="none" cap="none" strike="noStrike">
+                <a:solidFill>
+                  <a:srgbClr val="000000"/>
+                </a:solidFill>
+                <a:latin typeface="Arial"/>
+                <a:ea typeface="Arial"/>
+                <a:cs typeface="Arial"/>
+                <a:sym typeface="Arial"/>
+              </a:rPr>
+              <a:t>Receber produto</a:t>
             </a:r>
             <a:endParaRPr b="0" i="0" sz="1400" u="none" cap="none" strike="noStrike">
               <a:solidFill>
@@ -12297,7 +12946,854 @@
       </p:sp>
       <p:pic>
         <p:nvPicPr>
-          <p:cNvPr id="124" name="Google Shape;124;p17"/>
+          <p:cNvPr id="132" name="Google Shape;132;p17"/>
+          <p:cNvPicPr preferRelativeResize="0"/>
+          <p:nvPr/>
+        </p:nvPicPr>
+        <p:blipFill rotWithShape="1">
+          <a:blip r:embed="rId3">
+            <a:alphaModFix/>
+          </a:blip>
+          <a:srcRect b="12374" l="0" r="9624" t="12384"/>
+          <a:stretch/>
+        </p:blipFill>
+        <p:spPr>
+          <a:xfrm>
+            <a:off x="2538725" y="1428250"/>
+            <a:ext cx="852200" cy="1304325"/>
+          </a:xfrm>
+          <a:prstGeom prst="rect">
+            <a:avLst/>
+          </a:prstGeom>
+          <a:noFill/>
+          <a:ln>
+            <a:noFill/>
+          </a:ln>
+        </p:spPr>
+      </p:pic>
+      <p:sp>
+        <p:nvSpPr>
+          <p:cNvPr id="133" name="Google Shape;133;p17"/>
+          <p:cNvSpPr txBox="1"/>
+          <p:nvPr/>
+        </p:nvSpPr>
+        <p:spPr>
+          <a:xfrm>
+            <a:off x="4837825" y="3291875"/>
+            <a:ext cx="2377200" cy="546900"/>
+          </a:xfrm>
+          <a:prstGeom prst="rect">
+            <a:avLst/>
+          </a:prstGeom>
+          <a:noFill/>
+          <a:ln>
+            <a:noFill/>
+          </a:ln>
+        </p:spPr>
+        <p:txBody>
+          <a:bodyPr anchorCtr="0" anchor="t" bIns="91425" lIns="91425" spcFirstLastPara="1" rIns="91425" wrap="square" tIns="91425">
+            <a:noAutofit/>
+          </a:bodyPr>
+          <a:lstStyle/>
+          <a:p>
+            <a:pPr indent="-317500" lvl="0" marL="457200" marR="0" rtl="0" algn="l">
+              <a:lnSpc>
+                <a:spcPct val="100000"/>
+              </a:lnSpc>
+              <a:spcBef>
+                <a:spcPts val="0"/>
+              </a:spcBef>
+              <a:spcAft>
+                <a:spcPts val="0"/>
+              </a:spcAft>
+              <a:buClr>
+                <a:srgbClr val="000000"/>
+              </a:buClr>
+              <a:buSzPts val="1400"/>
+              <a:buFont typeface="Arial"/>
+              <a:buChar char="●"/>
+            </a:pPr>
+            <a:r>
+              <a:rPr b="0" i="0" lang="pt-BR" sz="1400" u="none" cap="none" strike="noStrike">
+                <a:solidFill>
+                  <a:srgbClr val="000000"/>
+                </a:solidFill>
+                <a:latin typeface="Arial"/>
+                <a:ea typeface="Arial"/>
+                <a:cs typeface="Arial"/>
+                <a:sym typeface="Arial"/>
+              </a:rPr>
+              <a:t>Entregar pedido</a:t>
+            </a:r>
+            <a:endParaRPr b="0" i="0" sz="1400" u="none" cap="none" strike="noStrike">
+              <a:solidFill>
+                <a:srgbClr val="000000"/>
+              </a:solidFill>
+              <a:latin typeface="Arial"/>
+              <a:ea typeface="Arial"/>
+              <a:cs typeface="Arial"/>
+              <a:sym typeface="Arial"/>
+            </a:endParaRPr>
+          </a:p>
+          <a:p>
+            <a:pPr indent="0" lvl="0" marL="457200" marR="0" rtl="0" algn="l">
+              <a:lnSpc>
+                <a:spcPct val="100000"/>
+              </a:lnSpc>
+              <a:spcBef>
+                <a:spcPts val="0"/>
+              </a:spcBef>
+              <a:spcAft>
+                <a:spcPts val="0"/>
+              </a:spcAft>
+              <a:buClr>
+                <a:srgbClr val="000000"/>
+              </a:buClr>
+              <a:buSzPts val="1400"/>
+              <a:buFont typeface="Arial"/>
+              <a:buNone/>
+            </a:pPr>
+            <a:r>
+              <a:t/>
+            </a:r>
+            <a:endParaRPr b="0" i="0" sz="1400" u="none" cap="none" strike="noStrike">
+              <a:solidFill>
+                <a:srgbClr val="000000"/>
+              </a:solidFill>
+              <a:latin typeface="Arial"/>
+              <a:ea typeface="Arial"/>
+              <a:cs typeface="Arial"/>
+              <a:sym typeface="Arial"/>
+            </a:endParaRPr>
+          </a:p>
+        </p:txBody>
+      </p:sp>
+      <p:sp>
+        <p:nvSpPr>
+          <p:cNvPr id="134" name="Google Shape;134;p17"/>
+          <p:cNvSpPr/>
+          <p:nvPr/>
+        </p:nvSpPr>
+        <p:spPr>
+          <a:xfrm>
+            <a:off x="4982725" y="3291875"/>
+            <a:ext cx="80100" cy="639300"/>
+          </a:xfrm>
+          <a:prstGeom prst="leftBracket">
+            <a:avLst>
+              <a:gd fmla="val 8333" name="adj"/>
+            </a:avLst>
+          </a:prstGeom>
+          <a:noFill/>
+          <a:ln cap="flat" cmpd="sng" w="19050">
+            <a:solidFill>
+              <a:srgbClr val="000000"/>
+            </a:solidFill>
+            <a:prstDash val="solid"/>
+            <a:round/>
+            <a:headEnd len="sm" w="sm" type="none"/>
+            <a:tailEnd len="sm" w="sm" type="none"/>
+          </a:ln>
+        </p:spPr>
+        <p:txBody>
+          <a:bodyPr anchorCtr="0" anchor="ctr" bIns="91425" lIns="91425" spcFirstLastPara="1" rIns="91425" wrap="square" tIns="91425">
+            <a:noAutofit/>
+          </a:bodyPr>
+          <a:lstStyle/>
+          <a:p>
+            <a:pPr indent="0" lvl="0" marL="0" marR="0" rtl="0" algn="l">
+              <a:lnSpc>
+                <a:spcPct val="100000"/>
+              </a:lnSpc>
+              <a:spcBef>
+                <a:spcPts val="0"/>
+              </a:spcBef>
+              <a:spcAft>
+                <a:spcPts val="0"/>
+              </a:spcAft>
+              <a:buClr>
+                <a:srgbClr val="000000"/>
+              </a:buClr>
+              <a:buSzPts val="1400"/>
+              <a:buFont typeface="Arial"/>
+              <a:buNone/>
+            </a:pPr>
+            <a:r>
+              <a:t/>
+            </a:r>
+            <a:endParaRPr b="1" i="0" sz="1400" u="none" cap="none" strike="noStrike">
+              <a:solidFill>
+                <a:srgbClr val="000000"/>
+              </a:solidFill>
+              <a:latin typeface="Arial"/>
+              <a:ea typeface="Arial"/>
+              <a:cs typeface="Arial"/>
+              <a:sym typeface="Arial"/>
+            </a:endParaRPr>
+          </a:p>
+        </p:txBody>
+      </p:sp>
+      <p:sp>
+        <p:nvSpPr>
+          <p:cNvPr id="135" name="Google Shape;135;p17"/>
+          <p:cNvSpPr/>
+          <p:nvPr/>
+        </p:nvSpPr>
+        <p:spPr>
+          <a:xfrm>
+            <a:off x="6824675" y="3293350"/>
+            <a:ext cx="80100" cy="639300"/>
+          </a:xfrm>
+          <a:prstGeom prst="rightBracket">
+            <a:avLst>
+              <a:gd fmla="val 8333" name="adj"/>
+            </a:avLst>
+          </a:prstGeom>
+          <a:noFill/>
+          <a:ln cap="flat" cmpd="sng" w="19050">
+            <a:solidFill>
+              <a:srgbClr val="000000"/>
+            </a:solidFill>
+            <a:prstDash val="solid"/>
+            <a:round/>
+            <a:headEnd len="sm" w="sm" type="none"/>
+            <a:tailEnd len="sm" w="sm" type="none"/>
+          </a:ln>
+        </p:spPr>
+        <p:txBody>
+          <a:bodyPr anchorCtr="0" anchor="ctr" bIns="91425" lIns="91425" spcFirstLastPara="1" rIns="91425" wrap="square" tIns="91425">
+            <a:noAutofit/>
+          </a:bodyPr>
+          <a:lstStyle/>
+          <a:p>
+            <a:pPr indent="0" lvl="0" marL="0" marR="0" rtl="0" algn="l">
+              <a:lnSpc>
+                <a:spcPct val="100000"/>
+              </a:lnSpc>
+              <a:spcBef>
+                <a:spcPts val="0"/>
+              </a:spcBef>
+              <a:spcAft>
+                <a:spcPts val="0"/>
+              </a:spcAft>
+              <a:buClr>
+                <a:srgbClr val="000000"/>
+              </a:buClr>
+              <a:buSzPts val="1400"/>
+              <a:buFont typeface="Arial"/>
+              <a:buNone/>
+            </a:pPr>
+            <a:r>
+              <a:t/>
+            </a:r>
+            <a:endParaRPr b="1" i="0" sz="1400" u="none" cap="none" strike="noStrike">
+              <a:solidFill>
+                <a:srgbClr val="000000"/>
+              </a:solidFill>
+              <a:latin typeface="Arial"/>
+              <a:ea typeface="Arial"/>
+              <a:cs typeface="Arial"/>
+              <a:sym typeface="Arial"/>
+            </a:endParaRPr>
+          </a:p>
+        </p:txBody>
+      </p:sp>
+      <p:cxnSp>
+        <p:nvCxnSpPr>
+          <p:cNvPr id="136" name="Google Shape;136;p17"/>
+          <p:cNvCxnSpPr>
+            <a:stCxn id="127" idx="2"/>
+            <a:endCxn id="132" idx="0"/>
+          </p:cNvCxnSpPr>
+          <p:nvPr/>
+        </p:nvCxnSpPr>
+        <p:spPr>
+          <a:xfrm rot="5400000">
+            <a:off x="3331588" y="421982"/>
+            <a:ext cx="639300" cy="1373100"/>
+          </a:xfrm>
+          <a:prstGeom prst="curvedConnector3">
+            <a:avLst>
+              <a:gd fmla="val 56267" name="adj1"/>
+            </a:avLst>
+          </a:prstGeom>
+          <a:noFill/>
+          <a:ln cap="flat" cmpd="sng" w="19050">
+            <a:solidFill>
+              <a:srgbClr val="000000"/>
+            </a:solidFill>
+            <a:prstDash val="solid"/>
+            <a:round/>
+            <a:headEnd len="sm" w="sm" type="none"/>
+            <a:tailEnd len="sm" w="sm" type="none"/>
+          </a:ln>
+        </p:spPr>
+      </p:cxnSp>
+      <p:cxnSp>
+        <p:nvCxnSpPr>
+          <p:cNvPr id="137" name="Google Shape;137;p17"/>
+          <p:cNvCxnSpPr>
+            <a:stCxn id="127" idx="2"/>
+            <a:endCxn id="134" idx="1"/>
+          </p:cNvCxnSpPr>
+          <p:nvPr/>
+        </p:nvCxnSpPr>
+        <p:spPr>
+          <a:xfrm flipH="1" rot="-5400000">
+            <a:off x="3248938" y="1877732"/>
+            <a:ext cx="2822700" cy="645000"/>
+          </a:xfrm>
+          <a:prstGeom prst="curvedConnector2">
+            <a:avLst/>
+          </a:prstGeom>
+          <a:noFill/>
+          <a:ln cap="flat" cmpd="sng" w="19050">
+            <a:solidFill>
+              <a:srgbClr val="000000"/>
+            </a:solidFill>
+            <a:prstDash val="solid"/>
+            <a:round/>
+            <a:headEnd len="sm" w="sm" type="none"/>
+            <a:tailEnd len="sm" w="sm" type="none"/>
+          </a:ln>
+        </p:spPr>
+      </p:cxnSp>
+      <p:sp>
+        <p:nvSpPr>
+          <p:cNvPr id="138" name="Google Shape;138;p17"/>
+          <p:cNvSpPr/>
+          <p:nvPr/>
+        </p:nvSpPr>
+        <p:spPr>
+          <a:xfrm>
+            <a:off x="3999600" y="2014725"/>
+            <a:ext cx="1063200" cy="546900"/>
+          </a:xfrm>
+          <a:prstGeom prst="rect">
+            <a:avLst/>
+          </a:prstGeom>
+          <a:solidFill>
+            <a:srgbClr val="C9DAF8"/>
+          </a:solidFill>
+          <a:ln cap="flat" cmpd="sng" w="9525">
+            <a:solidFill>
+              <a:srgbClr val="000000"/>
+            </a:solidFill>
+            <a:prstDash val="solid"/>
+            <a:round/>
+            <a:headEnd len="sm" w="sm" type="none"/>
+            <a:tailEnd len="sm" w="sm" type="none"/>
+          </a:ln>
+        </p:spPr>
+        <p:txBody>
+          <a:bodyPr anchorCtr="0" anchor="ctr" bIns="91425" lIns="91425" spcFirstLastPara="1" rIns="91425" wrap="square" tIns="91425">
+            <a:noAutofit/>
+          </a:bodyPr>
+          <a:lstStyle/>
+          <a:p>
+            <a:pPr indent="0" lvl="0" marL="0" marR="0" rtl="0" algn="ctr">
+              <a:lnSpc>
+                <a:spcPct val="100000"/>
+              </a:lnSpc>
+              <a:spcBef>
+                <a:spcPts val="0"/>
+              </a:spcBef>
+              <a:spcAft>
+                <a:spcPts val="0"/>
+              </a:spcAft>
+              <a:buClr>
+                <a:srgbClr val="000000"/>
+              </a:buClr>
+              <a:buSzPts val="1400"/>
+              <a:buFont typeface="Arial"/>
+              <a:buNone/>
+            </a:pPr>
+            <a:r>
+              <a:rPr b="0" i="0" lang="pt-BR" sz="1400" u="none" cap="none" strike="noStrike">
+                <a:solidFill>
+                  <a:srgbClr val="000000"/>
+                </a:solidFill>
+                <a:latin typeface="Arial"/>
+                <a:ea typeface="Arial"/>
+                <a:cs typeface="Arial"/>
+                <a:sym typeface="Arial"/>
+              </a:rPr>
+              <a:t>Setor de</a:t>
+            </a:r>
+            <a:endParaRPr b="0" i="0" sz="1400" u="none" cap="none" strike="noStrike">
+              <a:solidFill>
+                <a:srgbClr val="000000"/>
+              </a:solidFill>
+              <a:latin typeface="Arial"/>
+              <a:ea typeface="Arial"/>
+              <a:cs typeface="Arial"/>
+              <a:sym typeface="Arial"/>
+            </a:endParaRPr>
+          </a:p>
+          <a:p>
+            <a:pPr indent="0" lvl="0" marL="0" marR="0" rtl="0" algn="ctr">
+              <a:lnSpc>
+                <a:spcPct val="100000"/>
+              </a:lnSpc>
+              <a:spcBef>
+                <a:spcPts val="0"/>
+              </a:spcBef>
+              <a:spcAft>
+                <a:spcPts val="0"/>
+              </a:spcAft>
+              <a:buClr>
+                <a:srgbClr val="000000"/>
+              </a:buClr>
+              <a:buSzPts val="1400"/>
+              <a:buFont typeface="Arial"/>
+              <a:buNone/>
+            </a:pPr>
+            <a:r>
+              <a:rPr b="0" i="0" lang="pt-BR" sz="1400" u="none" cap="none" strike="noStrike">
+                <a:solidFill>
+                  <a:srgbClr val="000000"/>
+                </a:solidFill>
+                <a:latin typeface="Arial"/>
+                <a:ea typeface="Arial"/>
+                <a:cs typeface="Arial"/>
+                <a:sym typeface="Arial"/>
+              </a:rPr>
+              <a:t>entrega</a:t>
+            </a:r>
+            <a:endParaRPr b="0" i="0" sz="1400" u="none" cap="none" strike="noStrike">
+              <a:solidFill>
+                <a:srgbClr val="000000"/>
+              </a:solidFill>
+              <a:latin typeface="Arial"/>
+              <a:ea typeface="Arial"/>
+              <a:cs typeface="Arial"/>
+              <a:sym typeface="Arial"/>
+            </a:endParaRPr>
+          </a:p>
+        </p:txBody>
+      </p:sp>
+    </p:spTree>
+  </p:cSld>
+  <p:clrMapOvr>
+    <a:masterClrMapping/>
+  </p:clrMapOvr>
+</p:sld>
+</file>
+
+<file path=ppt/slides/slide6.xml><?xml version="1.0" encoding="utf-8"?>
+<p:sld xmlns:a="http://schemas.openxmlformats.org/drawingml/2006/main" xmlns:r="http://schemas.openxmlformats.org/officeDocument/2006/relationships" xmlns:mc="http://schemas.openxmlformats.org/markup-compatibility/2006" xmlns:mv="urn:schemas-microsoft-com:mac:vml" xmlns:p="http://schemas.openxmlformats.org/presentationml/2006/main" xmlns:c="http://schemas.openxmlformats.org/drawingml/2006/chart" xmlns:dgm="http://schemas.openxmlformats.org/drawingml/2006/diagram" xmlns:o="urn:schemas-microsoft-com:office:office" xmlns:v="urn:schemas-microsoft-com:vml" xmlns:pvml="urn:schemas-microsoft-com:office:powerpoint" xmlns:com="http://schemas.openxmlformats.org/drawingml/2006/compatibility" xmlns:p14="http://schemas.microsoft.com/office/powerpoint/2010/main" xmlns:p15="http://schemas.microsoft.com/office/powerpoint/2012/main">
+  <p:cSld>
+    <p:spTree>
+      <p:nvGrpSpPr>
+        <p:cNvPr id="142" name="Shape 142"/>
+        <p:cNvGrpSpPr/>
+        <p:nvPr/>
+      </p:nvGrpSpPr>
+      <p:grpSpPr>
+        <a:xfrm>
+          <a:off x="0" y="0"/>
+          <a:ext cx="0" cy="0"/>
+          <a:chOff x="0" y="0"/>
+          <a:chExt cx="0" cy="0"/>
+        </a:xfrm>
+      </p:grpSpPr>
+      <p:sp>
+        <p:nvSpPr>
+          <p:cNvPr id="143" name="Google Shape;143;p18"/>
+          <p:cNvSpPr/>
+          <p:nvPr/>
+        </p:nvSpPr>
+        <p:spPr>
+          <a:xfrm>
+            <a:off x="241100" y="1360375"/>
+            <a:ext cx="8733300" cy="3589800"/>
+          </a:xfrm>
+          <a:prstGeom prst="rect">
+            <a:avLst/>
+          </a:prstGeom>
+          <a:solidFill>
+            <a:srgbClr val="FFFFFF"/>
+          </a:solidFill>
+          <a:ln cap="flat" cmpd="sng" w="19050">
+            <a:solidFill>
+              <a:srgbClr val="000000"/>
+            </a:solidFill>
+            <a:prstDash val="solid"/>
+            <a:round/>
+            <a:headEnd len="sm" w="sm" type="none"/>
+            <a:tailEnd len="sm" w="sm" type="none"/>
+          </a:ln>
+        </p:spPr>
+        <p:txBody>
+          <a:bodyPr anchorCtr="0" anchor="ctr" bIns="91425" lIns="91425" spcFirstLastPara="1" rIns="91425" wrap="square" tIns="91425">
+            <a:noAutofit/>
+          </a:bodyPr>
+          <a:lstStyle/>
+          <a:p>
+            <a:pPr indent="0" lvl="0" marL="0" marR="0" rtl="0" algn="l">
+              <a:lnSpc>
+                <a:spcPct val="100000"/>
+              </a:lnSpc>
+              <a:spcBef>
+                <a:spcPts val="0"/>
+              </a:spcBef>
+              <a:spcAft>
+                <a:spcPts val="0"/>
+              </a:spcAft>
+              <a:buClr>
+                <a:srgbClr val="000000"/>
+              </a:buClr>
+              <a:buSzPts val="1400"/>
+              <a:buFont typeface="Arial"/>
+              <a:buNone/>
+            </a:pPr>
+            <a:r>
+              <a:t/>
+            </a:r>
+            <a:endParaRPr b="0" i="0" sz="1400" u="none" cap="none" strike="noStrike">
+              <a:solidFill>
+                <a:srgbClr val="000000"/>
+              </a:solidFill>
+              <a:latin typeface="Arial"/>
+              <a:ea typeface="Arial"/>
+              <a:cs typeface="Arial"/>
+              <a:sym typeface="Arial"/>
+            </a:endParaRPr>
+          </a:p>
+        </p:txBody>
+      </p:sp>
+      <p:sp>
+        <p:nvSpPr>
+          <p:cNvPr id="144" name="Google Shape;144;p18"/>
+          <p:cNvSpPr/>
+          <p:nvPr/>
+        </p:nvSpPr>
+        <p:spPr>
+          <a:xfrm>
+            <a:off x="3411525" y="68275"/>
+            <a:ext cx="1852525" cy="800675"/>
+          </a:xfrm>
+          <a:prstGeom prst="flowChartPunchedTape">
+            <a:avLst/>
+          </a:prstGeom>
+          <a:solidFill>
+            <a:srgbClr val="EAD1DC"/>
+          </a:solidFill>
+          <a:ln cap="flat" cmpd="sng" w="9525">
+            <a:solidFill>
+              <a:srgbClr val="000000"/>
+            </a:solidFill>
+            <a:prstDash val="solid"/>
+            <a:round/>
+            <a:headEnd len="sm" w="sm" type="none"/>
+            <a:tailEnd len="sm" w="sm" type="none"/>
+          </a:ln>
+        </p:spPr>
+        <p:txBody>
+          <a:bodyPr anchorCtr="0" anchor="ctr" bIns="91425" lIns="91425" spcFirstLastPara="1" rIns="91425" wrap="square" tIns="91425">
+            <a:noAutofit/>
+          </a:bodyPr>
+          <a:lstStyle/>
+          <a:p>
+            <a:pPr indent="0" lvl="0" marL="0" marR="0" rtl="0" algn="l">
+              <a:lnSpc>
+                <a:spcPct val="100000"/>
+              </a:lnSpc>
+              <a:spcBef>
+                <a:spcPts val="0"/>
+              </a:spcBef>
+              <a:spcAft>
+                <a:spcPts val="0"/>
+              </a:spcAft>
+              <a:buClr>
+                <a:srgbClr val="000000"/>
+              </a:buClr>
+              <a:buSzPts val="1400"/>
+              <a:buFont typeface="Arial"/>
+              <a:buNone/>
+            </a:pPr>
+            <a:r>
+              <a:t/>
+            </a:r>
+            <a:endParaRPr b="0" i="0" sz="1400" u="none" cap="none" strike="noStrike">
+              <a:solidFill>
+                <a:srgbClr val="000000"/>
+              </a:solidFill>
+              <a:latin typeface="Arial"/>
+              <a:ea typeface="Arial"/>
+              <a:cs typeface="Arial"/>
+              <a:sym typeface="Arial"/>
+            </a:endParaRPr>
+          </a:p>
+        </p:txBody>
+      </p:sp>
+      <p:sp>
+        <p:nvSpPr>
+          <p:cNvPr id="145" name="Google Shape;145;p18"/>
+          <p:cNvSpPr txBox="1"/>
+          <p:nvPr/>
+        </p:nvSpPr>
+        <p:spPr>
+          <a:xfrm>
+            <a:off x="231875" y="1324375"/>
+            <a:ext cx="1852500" cy="334800"/>
+          </a:xfrm>
+          <a:prstGeom prst="rect">
+            <a:avLst/>
+          </a:prstGeom>
+          <a:noFill/>
+          <a:ln>
+            <a:noFill/>
+          </a:ln>
+        </p:spPr>
+        <p:txBody>
+          <a:bodyPr anchorCtr="0" anchor="t" bIns="91425" lIns="91425" spcFirstLastPara="1" rIns="91425" wrap="square" tIns="91425">
+            <a:noAutofit/>
+          </a:bodyPr>
+          <a:lstStyle/>
+          <a:p>
+            <a:pPr indent="0" lvl="0" marL="0" marR="0" rtl="0" algn="l">
+              <a:lnSpc>
+                <a:spcPct val="100000"/>
+              </a:lnSpc>
+              <a:spcBef>
+                <a:spcPts val="0"/>
+              </a:spcBef>
+              <a:spcAft>
+                <a:spcPts val="0"/>
+              </a:spcAft>
+              <a:buClr>
+                <a:srgbClr val="000000"/>
+              </a:buClr>
+              <a:buSzPts val="1400"/>
+              <a:buFont typeface="Arial"/>
+              <a:buNone/>
+            </a:pPr>
+            <a:r>
+              <a:rPr b="1" i="0" lang="pt-BR" sz="1400" u="none" cap="none" strike="noStrike">
+                <a:solidFill>
+                  <a:srgbClr val="000000"/>
+                </a:solidFill>
+                <a:latin typeface="Arial"/>
+                <a:ea typeface="Arial"/>
+                <a:cs typeface="Arial"/>
+                <a:sym typeface="Arial"/>
+              </a:rPr>
+              <a:t>Nós Operacionais</a:t>
+            </a:r>
+            <a:endParaRPr b="1" i="0" sz="1400" u="none" cap="none" strike="noStrike">
+              <a:solidFill>
+                <a:srgbClr val="000000"/>
+              </a:solidFill>
+              <a:latin typeface="Arial"/>
+              <a:ea typeface="Arial"/>
+              <a:cs typeface="Arial"/>
+              <a:sym typeface="Arial"/>
+            </a:endParaRPr>
+          </a:p>
+        </p:txBody>
+      </p:sp>
+      <p:cxnSp>
+        <p:nvCxnSpPr>
+          <p:cNvPr id="146" name="Google Shape;146;p18"/>
+          <p:cNvCxnSpPr/>
+          <p:nvPr/>
+        </p:nvCxnSpPr>
+        <p:spPr>
+          <a:xfrm>
+            <a:off x="254500" y="2745075"/>
+            <a:ext cx="8733300" cy="0"/>
+          </a:xfrm>
+          <a:prstGeom prst="straightConnector1">
+            <a:avLst/>
+          </a:prstGeom>
+          <a:noFill/>
+          <a:ln cap="flat" cmpd="sng" w="19050">
+            <a:solidFill>
+              <a:srgbClr val="000000"/>
+            </a:solidFill>
+            <a:prstDash val="solid"/>
+            <a:round/>
+            <a:headEnd len="sm" w="sm" type="none"/>
+            <a:tailEnd len="sm" w="sm" type="none"/>
+          </a:ln>
+        </p:spPr>
+      </p:cxnSp>
+      <p:sp>
+        <p:nvSpPr>
+          <p:cNvPr id="147" name="Google Shape;147;p18"/>
+          <p:cNvSpPr txBox="1"/>
+          <p:nvPr/>
+        </p:nvSpPr>
+        <p:spPr>
+          <a:xfrm>
+            <a:off x="218475" y="2757575"/>
+            <a:ext cx="2540700" cy="420300"/>
+          </a:xfrm>
+          <a:prstGeom prst="rect">
+            <a:avLst/>
+          </a:prstGeom>
+          <a:noFill/>
+          <a:ln>
+            <a:noFill/>
+          </a:ln>
+        </p:spPr>
+        <p:txBody>
+          <a:bodyPr anchorCtr="0" anchor="t" bIns="91425" lIns="91425" spcFirstLastPara="1" rIns="91425" wrap="square" tIns="91425">
+            <a:noAutofit/>
+          </a:bodyPr>
+          <a:lstStyle/>
+          <a:p>
+            <a:pPr indent="0" lvl="0" marL="0" marR="0" rtl="0" algn="l">
+              <a:lnSpc>
+                <a:spcPct val="100000"/>
+              </a:lnSpc>
+              <a:spcBef>
+                <a:spcPts val="0"/>
+              </a:spcBef>
+              <a:spcAft>
+                <a:spcPts val="0"/>
+              </a:spcAft>
+              <a:buClr>
+                <a:srgbClr val="000000"/>
+              </a:buClr>
+              <a:buSzPts val="1400"/>
+              <a:buFont typeface="Arial"/>
+              <a:buNone/>
+            </a:pPr>
+            <a:r>
+              <a:rPr b="1" i="0" lang="pt-BR" sz="1400" u="none" cap="none" strike="noStrike">
+                <a:solidFill>
+                  <a:srgbClr val="000000"/>
+                </a:solidFill>
+                <a:latin typeface="Arial"/>
+                <a:ea typeface="Arial"/>
+                <a:cs typeface="Arial"/>
+                <a:sym typeface="Arial"/>
+              </a:rPr>
+              <a:t>Capacidades</a:t>
+            </a:r>
+            <a:endParaRPr b="1" i="0" sz="1400" u="none" cap="none" strike="noStrike">
+              <a:solidFill>
+                <a:srgbClr val="000000"/>
+              </a:solidFill>
+              <a:latin typeface="Arial"/>
+              <a:ea typeface="Arial"/>
+              <a:cs typeface="Arial"/>
+              <a:sym typeface="Arial"/>
+            </a:endParaRPr>
+          </a:p>
+          <a:p>
+            <a:pPr indent="0" lvl="0" marL="0" marR="0" rtl="0" algn="l">
+              <a:lnSpc>
+                <a:spcPct val="100000"/>
+              </a:lnSpc>
+              <a:spcBef>
+                <a:spcPts val="0"/>
+              </a:spcBef>
+              <a:spcAft>
+                <a:spcPts val="0"/>
+              </a:spcAft>
+              <a:buClr>
+                <a:srgbClr val="000000"/>
+              </a:buClr>
+              <a:buSzPts val="1400"/>
+              <a:buFont typeface="Arial"/>
+              <a:buNone/>
+            </a:pPr>
+            <a:r>
+              <a:rPr b="1" i="0" lang="pt-BR" sz="1400" u="none" cap="none" strike="noStrike">
+                <a:solidFill>
+                  <a:srgbClr val="000000"/>
+                </a:solidFill>
+                <a:latin typeface="Arial"/>
+                <a:ea typeface="Arial"/>
+                <a:cs typeface="Arial"/>
+                <a:sym typeface="Arial"/>
+              </a:rPr>
+              <a:t>Operacionais</a:t>
+            </a:r>
+            <a:endParaRPr b="1" i="0" sz="1400" u="none" cap="none" strike="noStrike">
+              <a:solidFill>
+                <a:srgbClr val="000000"/>
+              </a:solidFill>
+              <a:latin typeface="Arial"/>
+              <a:ea typeface="Arial"/>
+              <a:cs typeface="Arial"/>
+              <a:sym typeface="Arial"/>
+            </a:endParaRPr>
+          </a:p>
+        </p:txBody>
+      </p:sp>
+      <p:sp>
+        <p:nvSpPr>
+          <p:cNvPr id="148" name="Google Shape;148;p18"/>
+          <p:cNvSpPr txBox="1"/>
+          <p:nvPr/>
+        </p:nvSpPr>
+        <p:spPr>
+          <a:xfrm>
+            <a:off x="3225988" y="267500"/>
+            <a:ext cx="2223600" cy="420300"/>
+          </a:xfrm>
+          <a:prstGeom prst="rect">
+            <a:avLst/>
+          </a:prstGeom>
+          <a:noFill/>
+          <a:ln>
+            <a:noFill/>
+          </a:ln>
+        </p:spPr>
+        <p:txBody>
+          <a:bodyPr anchorCtr="0" anchor="t" bIns="91425" lIns="91425" spcFirstLastPara="1" rIns="91425" wrap="square" tIns="91425">
+            <a:noAutofit/>
+          </a:bodyPr>
+          <a:lstStyle/>
+          <a:p>
+            <a:pPr indent="0" lvl="0" marL="0" marR="0" rtl="0" algn="ctr">
+              <a:lnSpc>
+                <a:spcPct val="100000"/>
+              </a:lnSpc>
+              <a:spcBef>
+                <a:spcPts val="0"/>
+              </a:spcBef>
+              <a:spcAft>
+                <a:spcPts val="0"/>
+              </a:spcAft>
+              <a:buClr>
+                <a:srgbClr val="000000"/>
+              </a:buClr>
+              <a:buSzPts val="1400"/>
+              <a:buFont typeface="Arial"/>
+              <a:buNone/>
+            </a:pPr>
+            <a:r>
+              <a:rPr b="0" i="0" lang="pt-BR" sz="1400" u="none" cap="none" strike="noStrike">
+                <a:solidFill>
+                  <a:srgbClr val="000000"/>
+                </a:solidFill>
+                <a:latin typeface="Arial"/>
+                <a:ea typeface="Arial"/>
+                <a:cs typeface="Arial"/>
+                <a:sym typeface="Arial"/>
+              </a:rPr>
+              <a:t>Devolver compra</a:t>
+            </a:r>
+            <a:endParaRPr b="0" i="0" sz="1400" u="none" cap="none" strike="noStrike">
+              <a:solidFill>
+                <a:srgbClr val="000000"/>
+              </a:solidFill>
+              <a:latin typeface="Arial"/>
+              <a:ea typeface="Arial"/>
+              <a:cs typeface="Arial"/>
+              <a:sym typeface="Arial"/>
+            </a:endParaRPr>
+          </a:p>
+        </p:txBody>
+      </p:sp>
+      <p:pic>
+        <p:nvPicPr>
+          <p:cNvPr id="149" name="Google Shape;149;p18"/>
           <p:cNvPicPr preferRelativeResize="0"/>
           <p:nvPr/>
         </p:nvPicPr>
@@ -12324,13 +13820,13 @@
       </p:pic>
       <p:sp>
         <p:nvSpPr>
-          <p:cNvPr id="125" name="Google Shape;125;p17"/>
+          <p:cNvPr id="150" name="Google Shape;150;p18"/>
           <p:cNvSpPr txBox="1"/>
           <p:nvPr/>
         </p:nvSpPr>
         <p:spPr>
           <a:xfrm>
-            <a:off x="5133275" y="3230050"/>
+            <a:off x="4918400" y="3291875"/>
             <a:ext cx="2377200" cy="546900"/>
           </a:xfrm>
           <a:prstGeom prst="rect">
@@ -12365,8 +13861,16 @@
               <a:buChar char="●"/>
             </a:pPr>
             <a:r>
-              <a:rPr lang="pt-BR"/>
-              <a:t>Solicitar devolução de pedido</a:t>
+              <a:rPr b="0" i="0" lang="pt-BR" sz="1400" u="none" cap="none" strike="noStrike">
+                <a:solidFill>
+                  <a:srgbClr val="000000"/>
+                </a:solidFill>
+                <a:latin typeface="Arial"/>
+                <a:ea typeface="Arial"/>
+                <a:cs typeface="Arial"/>
+                <a:sym typeface="Arial"/>
+              </a:rPr>
+              <a:t>Receber devolução</a:t>
             </a:r>
             <a:endParaRPr b="0" i="0" sz="1400" u="none" cap="none" strike="noStrike">
               <a:solidFill>
@@ -12413,14 +13917,14 @@
       </p:sp>
       <p:sp>
         <p:nvSpPr>
-          <p:cNvPr id="126" name="Google Shape;126;p17"/>
+          <p:cNvPr id="151" name="Google Shape;151;p18"/>
           <p:cNvSpPr/>
           <p:nvPr/>
         </p:nvSpPr>
         <p:spPr>
           <a:xfrm>
-            <a:off x="4982725" y="3291875"/>
-            <a:ext cx="80100" cy="485100"/>
+            <a:off x="4982725" y="3139475"/>
+            <a:ext cx="80100" cy="728100"/>
           </a:xfrm>
           <a:prstGeom prst="leftBracket">
             <a:avLst>
@@ -12478,14 +13982,14 @@
       </p:sp>
       <p:sp>
         <p:nvSpPr>
-          <p:cNvPr id="127" name="Google Shape;127;p17"/>
+          <p:cNvPr id="152" name="Google Shape;152;p18"/>
           <p:cNvSpPr/>
           <p:nvPr/>
         </p:nvSpPr>
         <p:spPr>
           <a:xfrm>
-            <a:off x="7358075" y="3293350"/>
-            <a:ext cx="80100" cy="485100"/>
+            <a:off x="7205675" y="3140950"/>
+            <a:ext cx="80100" cy="728100"/>
           </a:xfrm>
           <a:prstGeom prst="rightBracket">
             <a:avLst>
@@ -12543,17 +14047,48 @@
       </p:sp>
       <p:cxnSp>
         <p:nvCxnSpPr>
-          <p:cNvPr id="128" name="Google Shape;128;p17"/>
+          <p:cNvPr id="153" name="Google Shape;153;p18"/>
           <p:cNvCxnSpPr>
-            <a:stCxn id="119" idx="2"/>
-            <a:endCxn id="124" idx="3"/>
+            <a:stCxn id="144" idx="2"/>
+            <a:endCxn id="149" idx="0"/>
           </p:cNvCxnSpPr>
           <p:nvPr/>
         </p:nvCxnSpPr>
         <p:spPr>
           <a:xfrm rot="5400000">
-            <a:off x="3218638" y="961232"/>
-            <a:ext cx="1291500" cy="946800"/>
+            <a:off x="3331588" y="421982"/>
+            <a:ext cx="639300" cy="1373100"/>
+          </a:xfrm>
+          <a:prstGeom prst="curvedConnector3">
+            <a:avLst>
+              <a:gd fmla="val 56267" name="adj1"/>
+            </a:avLst>
+          </a:prstGeom>
+          <a:noFill/>
+          <a:ln cap="flat" cmpd="sng" w="19050">
+            <a:solidFill>
+              <a:srgbClr val="000000"/>
+            </a:solidFill>
+            <a:prstDash val="solid"/>
+            <a:round/>
+            <a:headEnd len="sm" w="sm" type="none"/>
+            <a:tailEnd len="sm" w="sm" type="none"/>
+          </a:ln>
+        </p:spPr>
+      </p:cxnSp>
+      <p:cxnSp>
+        <p:nvCxnSpPr>
+          <p:cNvPr id="154" name="Google Shape;154;p18"/>
+          <p:cNvCxnSpPr>
+            <a:stCxn id="144" idx="2"/>
+            <a:endCxn id="151" idx="1"/>
+          </p:cNvCxnSpPr>
+          <p:nvPr/>
+        </p:nvCxnSpPr>
+        <p:spPr>
+          <a:xfrm flipH="1" rot="-5400000">
+            <a:off x="3302938" y="1823732"/>
+            <a:ext cx="2714700" cy="645000"/>
           </a:xfrm>
           <a:prstGeom prst="curvedConnector2">
             <a:avLst/>
@@ -12565,42 +14100,14 @@
             </a:solidFill>
             <a:prstDash val="solid"/>
             <a:round/>
-            <a:headEnd len="med" w="med" type="none"/>
-            <a:tailEnd len="med" w="med" type="none"/>
-          </a:ln>
-        </p:spPr>
-      </p:cxnSp>
-      <p:cxnSp>
-        <p:nvCxnSpPr>
-          <p:cNvPr id="129" name="Google Shape;129;p17"/>
-          <p:cNvCxnSpPr>
-            <a:endCxn id="126" idx="1"/>
-          </p:cNvCxnSpPr>
-          <p:nvPr/>
-        </p:nvCxnSpPr>
-        <p:spPr>
-          <a:xfrm flipH="1" rot="-5400000">
-            <a:off x="3304225" y="1855925"/>
-            <a:ext cx="2712000" cy="645000"/>
-          </a:xfrm>
-          <a:prstGeom prst="curvedConnector2">
-            <a:avLst/>
-          </a:prstGeom>
-          <a:noFill/>
-          <a:ln cap="flat" cmpd="sng" w="19050">
-            <a:solidFill>
-              <a:srgbClr val="000000"/>
-            </a:solidFill>
-            <a:prstDash val="solid"/>
-            <a:round/>
-            <a:headEnd len="med" w="med" type="none"/>
-            <a:tailEnd len="med" w="med" type="none"/>
+            <a:headEnd len="sm" w="sm" type="none"/>
+            <a:tailEnd len="sm" w="sm" type="none"/>
           </a:ln>
         </p:spPr>
       </p:cxnSp>
       <p:sp>
         <p:nvSpPr>
-          <p:cNvPr id="130" name="Google Shape;130;p17"/>
+          <p:cNvPr id="155" name="Google Shape;155;p18"/>
           <p:cNvSpPr/>
           <p:nvPr/>
         </p:nvSpPr>
@@ -12631,20 +14138,44 @@
           </a:bodyPr>
           <a:lstStyle/>
           <a:p>
-            <a:pPr indent="0" lvl="0" marL="0" rtl="0" algn="ctr">
-              <a:spcBef>
-                <a:spcPts val="0"/>
-              </a:spcBef>
-              <a:spcAft>
-                <a:spcPts val="0"/>
-              </a:spcAft>
+            <a:pPr indent="0" lvl="0" marL="0" marR="0" rtl="0" algn="ctr">
+              <a:lnSpc>
+                <a:spcPct val="100000"/>
+              </a:lnSpc>
+              <a:spcBef>
+                <a:spcPts val="0"/>
+              </a:spcBef>
+              <a:spcAft>
+                <a:spcPts val="0"/>
+              </a:spcAft>
+              <a:buClr>
+                <a:srgbClr val="000000"/>
+              </a:buClr>
+              <a:buSzPts val="1400"/>
+              <a:buFont typeface="Arial"/>
               <a:buNone/>
             </a:pPr>
             <a:r>
-              <a:rPr lang="pt-BR"/>
-              <a:t>Loja Online</a:t>
+              <a:rPr b="0" i="0" lang="pt-BR" sz="1400" u="none" cap="none" strike="noStrike">
+                <a:solidFill>
+                  <a:srgbClr val="000000"/>
+                </a:solidFill>
+                <a:latin typeface="Arial"/>
+                <a:ea typeface="Arial"/>
+                <a:cs typeface="Arial"/>
+                <a:sym typeface="Arial"/>
+              </a:rPr>
+              <a:t>Loja</a:t>
             </a:r>
-            <a:endParaRPr/>
+            <a:endParaRPr b="0" i="0" sz="1400" u="none" cap="none" strike="noStrike">
+              <a:solidFill>
+                <a:srgbClr val="000000"/>
+              </a:solidFill>
+              <a:latin typeface="Arial"/>
+              <a:ea typeface="Arial"/>
+              <a:cs typeface="Arial"/>
+              <a:sym typeface="Arial"/>
+            </a:endParaRPr>
           </a:p>
         </p:txBody>
       </p:sp>
@@ -12657,6 +14188,285 @@
 </file>
 
 <file path=ppt/theme/theme1.xml><?xml version="1.0" encoding="utf-8"?>
+<a:theme xmlns:a="http://schemas.openxmlformats.org/drawingml/2006/main" xmlns:r="http://schemas.openxmlformats.org/officeDocument/2006/relationships" name="Simple Light">
+  <a:themeElements>
+    <a:clrScheme name="Simple Light">
+      <a:dk1>
+        <a:srgbClr val="000000"/>
+      </a:dk1>
+      <a:lt1>
+        <a:srgbClr val="FFFFFF"/>
+      </a:lt1>
+      <a:dk2>
+        <a:srgbClr val="595959"/>
+      </a:dk2>
+      <a:lt2>
+        <a:srgbClr val="EEEEEE"/>
+      </a:lt2>
+      <a:accent1>
+        <a:srgbClr val="FFAB40"/>
+      </a:accent1>
+      <a:accent2>
+        <a:srgbClr val="212121"/>
+      </a:accent2>
+      <a:accent3>
+        <a:srgbClr val="78909C"/>
+      </a:accent3>
+      <a:accent4>
+        <a:srgbClr val="FFAB40"/>
+      </a:accent4>
+      <a:accent5>
+        <a:srgbClr val="0097A7"/>
+      </a:accent5>
+      <a:accent6>
+        <a:srgbClr val="EEFF41"/>
+      </a:accent6>
+      <a:hlink>
+        <a:srgbClr val="0097A7"/>
+      </a:hlink>
+      <a:folHlink>
+        <a:srgbClr val="0097A7"/>
+      </a:folHlink>
+    </a:clrScheme>
+    <a:fontScheme name="Office">
+      <a:majorFont>
+        <a:latin typeface="Arial"/>
+        <a:ea typeface=""/>
+        <a:cs typeface=""/>
+        <a:font script="Jpan" typeface="ＭＳ Ｐゴシック"/>
+        <a:font script="Hang" typeface="맑은 고딕"/>
+        <a:font script="Hans" typeface="宋体"/>
+        <a:font script="Hant" typeface="新細明體"/>
+        <a:font script="Arab" typeface="Times New Roman"/>
+        <a:font script="Hebr" typeface="Times New Roman"/>
+        <a:font script="Thai" typeface="Angsana New"/>
+        <a:font script="Ethi" typeface="Nyala"/>
+        <a:font script="Beng" typeface="Vrinda"/>
+        <a:font script="Gujr" typeface="Shruti"/>
+        <a:font script="Khmr" typeface="MoolBoran"/>
+        <a:font script="Knda" typeface="Tunga"/>
+        <a:font script="Guru" typeface="Raavi"/>
+        <a:font script="Cans" typeface="Euphemia"/>
+        <a:font script="Cher" typeface="Plantagenet Cherokee"/>
+        <a:font script="Yiii" typeface="Microsoft Yi Baiti"/>
+        <a:font script="Tibt" typeface="Microsoft Himalaya"/>
+        <a:font script="Thaa" typeface="MV Boli"/>
+        <a:font script="Deva" typeface="Mangal"/>
+        <a:font script="Telu" typeface="Gautami"/>
+        <a:font script="Taml" typeface="Latha"/>
+        <a:font script="Syrc" typeface="Estrangelo Edessa"/>
+        <a:font script="Orya" typeface="Kalinga"/>
+        <a:font script="Mlym" typeface="Kartika"/>
+        <a:font script="Laoo" typeface="DokChampa"/>
+        <a:font script="Sinh" typeface="Iskoola Pota"/>
+        <a:font script="Mong" typeface="Mongolian Baiti"/>
+        <a:font script="Viet" typeface="Times New Roman"/>
+        <a:font script="Uigh" typeface="Microsoft Uighur"/>
+        <a:font script="Geor" typeface="Sylfaen"/>
+      </a:majorFont>
+      <a:minorFont>
+        <a:latin typeface="Arial"/>
+        <a:ea typeface=""/>
+        <a:cs typeface=""/>
+        <a:font script="Jpan" typeface="ＭＳ Ｐゴシック"/>
+        <a:font script="Hang" typeface="맑은 고딕"/>
+        <a:font script="Hans" typeface="宋体"/>
+        <a:font script="Hant" typeface="新細明體"/>
+        <a:font script="Arab" typeface="Arial"/>
+        <a:font script="Hebr" typeface="Arial"/>
+        <a:font script="Thai" typeface="Cordia New"/>
+        <a:font script="Ethi" typeface="Nyala"/>
+        <a:font script="Beng" typeface="Vrinda"/>
+        <a:font script="Gujr" typeface="Shruti"/>
+        <a:font script="Khmr" typeface="DaunPenh"/>
+        <a:font script="Knda" typeface="Tunga"/>
+        <a:font script="Guru" typeface="Raavi"/>
+        <a:font script="Cans" typeface="Euphemia"/>
+        <a:font script="Cher" typeface="Plantagenet Cherokee"/>
+        <a:font script="Yiii" typeface="Microsoft Yi Baiti"/>
+        <a:font script="Tibt" typeface="Microsoft Himalaya"/>
+        <a:font script="Thaa" typeface="MV Boli"/>
+        <a:font script="Deva" typeface="Mangal"/>
+        <a:font script="Telu" typeface="Gautami"/>
+        <a:font script="Taml" typeface="Latha"/>
+        <a:font script="Syrc" typeface="Estrangelo Edessa"/>
+        <a:font script="Orya" typeface="Kalinga"/>
+        <a:font script="Mlym" typeface="Kartika"/>
+        <a:font script="Laoo" typeface="DokChampa"/>
+        <a:font script="Sinh" typeface="Iskoola Pota"/>
+        <a:font script="Mong" typeface="Mongolian Baiti"/>
+        <a:font script="Viet" typeface="Arial"/>
+        <a:font script="Uigh" typeface="Microsoft Uighur"/>
+        <a:font script="Geor" typeface="Sylfaen"/>
+      </a:minorFont>
+    </a:fontScheme>
+    <a:fmtScheme name="Office">
+      <a:fillStyleLst>
+        <a:solidFill>
+          <a:schemeClr val="phClr"/>
+        </a:solidFill>
+        <a:gradFill rotWithShape="1">
+          <a:gsLst>
+            <a:gs pos="0">
+              <a:schemeClr val="phClr">
+                <a:tint val="50000"/>
+                <a:satMod val="300000"/>
+              </a:schemeClr>
+            </a:gs>
+            <a:gs pos="35000">
+              <a:schemeClr val="phClr">
+                <a:tint val="37000"/>
+                <a:satMod val="300000"/>
+              </a:schemeClr>
+            </a:gs>
+            <a:gs pos="100000">
+              <a:schemeClr val="phClr">
+                <a:tint val="15000"/>
+                <a:satMod val="350000"/>
+              </a:schemeClr>
+            </a:gs>
+          </a:gsLst>
+          <a:lin ang="16200000" scaled="1"/>
+        </a:gradFill>
+        <a:gradFill rotWithShape="1">
+          <a:gsLst>
+            <a:gs pos="0">
+              <a:schemeClr val="phClr">
+                <a:tint val="100000"/>
+                <a:shade val="100000"/>
+                <a:satMod val="130000"/>
+              </a:schemeClr>
+            </a:gs>
+            <a:gs pos="100000">
+              <a:schemeClr val="phClr">
+                <a:tint val="50000"/>
+                <a:shade val="100000"/>
+                <a:satMod val="350000"/>
+              </a:schemeClr>
+            </a:gs>
+          </a:gsLst>
+          <a:lin ang="16200000" scaled="0"/>
+        </a:gradFill>
+      </a:fillStyleLst>
+      <a:lnStyleLst>
+        <a:ln w="9525" cap="flat" cmpd="sng" algn="ctr">
+          <a:solidFill>
+            <a:schemeClr val="phClr">
+              <a:shade val="95000"/>
+              <a:satMod val="105000"/>
+            </a:schemeClr>
+          </a:solidFill>
+          <a:prstDash val="solid"/>
+        </a:ln>
+        <a:ln w="25400" cap="flat" cmpd="sng" algn="ctr">
+          <a:solidFill>
+            <a:schemeClr val="phClr"/>
+          </a:solidFill>
+          <a:prstDash val="solid"/>
+        </a:ln>
+        <a:ln w="38100" cap="flat" cmpd="sng" algn="ctr">
+          <a:solidFill>
+            <a:schemeClr val="phClr"/>
+          </a:solidFill>
+          <a:prstDash val="solid"/>
+        </a:ln>
+      </a:lnStyleLst>
+      <a:effectStyleLst>
+        <a:effectStyle>
+          <a:effectLst>
+            <a:outerShdw blurRad="40000" dist="20000" dir="5400000" rotWithShape="0">
+              <a:srgbClr val="000000">
+                <a:alpha val="38000"/>
+              </a:srgbClr>
+            </a:outerShdw>
+          </a:effectLst>
+        </a:effectStyle>
+        <a:effectStyle>
+          <a:effectLst>
+            <a:outerShdw blurRad="40000" dist="23000" dir="5400000" rotWithShape="0">
+              <a:srgbClr val="000000">
+                <a:alpha val="35000"/>
+              </a:srgbClr>
+            </a:outerShdw>
+          </a:effectLst>
+        </a:effectStyle>
+        <a:effectStyle>
+          <a:effectLst>
+            <a:outerShdw blurRad="40000" dist="23000" dir="5400000" rotWithShape="0">
+              <a:srgbClr val="000000">
+                <a:alpha val="35000"/>
+              </a:srgbClr>
+            </a:outerShdw>
+          </a:effectLst>
+          <a:scene3d>
+            <a:camera prst="orthographicFront">
+              <a:rot lat="0" lon="0" rev="0"/>
+            </a:camera>
+            <a:lightRig rig="threePt" dir="t">
+              <a:rot lat="0" lon="0" rev="1200000"/>
+            </a:lightRig>
+          </a:scene3d>
+          <a:sp3d>
+            <a:bevelT w="63500" h="25400"/>
+          </a:sp3d>
+        </a:effectStyle>
+      </a:effectStyleLst>
+      <a:bgFillStyleLst>
+        <a:solidFill>
+          <a:schemeClr val="phClr"/>
+        </a:solidFill>
+        <a:gradFill rotWithShape="1">
+          <a:gsLst>
+            <a:gs pos="0">
+              <a:schemeClr val="phClr">
+                <a:tint val="40000"/>
+                <a:satMod val="350000"/>
+              </a:schemeClr>
+            </a:gs>
+            <a:gs pos="40000">
+              <a:schemeClr val="phClr">
+                <a:tint val="45000"/>
+                <a:shade val="99000"/>
+                <a:satMod val="350000"/>
+              </a:schemeClr>
+            </a:gs>
+            <a:gs pos="100000">
+              <a:schemeClr val="phClr">
+                <a:shade val="20000"/>
+                <a:satMod val="255000"/>
+              </a:schemeClr>
+            </a:gs>
+          </a:gsLst>
+          <a:path path="circle">
+            <a:fillToRect l="50000" t="-80000" r="50000" b="180000"/>
+          </a:path>
+        </a:gradFill>
+        <a:gradFill rotWithShape="1">
+          <a:gsLst>
+            <a:gs pos="0">
+              <a:schemeClr val="phClr">
+                <a:tint val="80000"/>
+                <a:satMod val="300000"/>
+              </a:schemeClr>
+            </a:gs>
+            <a:gs pos="100000">
+              <a:schemeClr val="phClr">
+                <a:shade val="30000"/>
+                <a:satMod val="200000"/>
+              </a:schemeClr>
+            </a:gs>
+          </a:gsLst>
+          <a:path path="circle">
+            <a:fillToRect l="50000" t="50000" r="50000" b="50000"/>
+          </a:path>
+        </a:gradFill>
+      </a:bgFillStyleLst>
+    </a:fmtScheme>
+  </a:themeElements>
+</a:theme>
+</file>
+
+<file path=ppt/theme/theme2.xml><?xml version="1.0" encoding="utf-8"?>
 <a:theme xmlns:a="http://schemas.openxmlformats.org/drawingml/2006/main" xmlns:r="http://schemas.openxmlformats.org/officeDocument/2006/relationships">
   <a:themeElements>
     <a:clrScheme name="Default">
@@ -12933,283 +14743,4 @@
     </a:fmtScheme>
   </a:themeElements>
 </a:theme>
-</file>
-
-<file path=ppt/theme/theme2.xml><?xml version="1.0" encoding="utf-8"?>
-<a:theme xmlns:a="http://schemas.openxmlformats.org/drawingml/2006/main" xmlns:r="http://schemas.openxmlformats.org/officeDocument/2006/relationships" name="Simple Light">
-  <a:themeElements>
-    <a:clrScheme name="Simple Light">
-      <a:dk1>
-        <a:srgbClr val="000000"/>
-      </a:dk1>
-      <a:lt1>
-        <a:srgbClr val="FFFFFF"/>
-      </a:lt1>
-      <a:dk2>
-        <a:srgbClr val="595959"/>
-      </a:dk2>
-      <a:lt2>
-        <a:srgbClr val="EEEEEE"/>
-      </a:lt2>
-      <a:accent1>
-        <a:srgbClr val="FFAB40"/>
-      </a:accent1>
-      <a:accent2>
-        <a:srgbClr val="212121"/>
-      </a:accent2>
-      <a:accent3>
-        <a:srgbClr val="78909C"/>
-      </a:accent3>
-      <a:accent4>
-        <a:srgbClr val="FFAB40"/>
-      </a:accent4>
-      <a:accent5>
-        <a:srgbClr val="0097A7"/>
-      </a:accent5>
-      <a:accent6>
-        <a:srgbClr val="EEFF41"/>
-      </a:accent6>
-      <a:hlink>
-        <a:srgbClr val="0097A7"/>
-      </a:hlink>
-      <a:folHlink>
-        <a:srgbClr val="0097A7"/>
-      </a:folHlink>
-    </a:clrScheme>
-    <a:fontScheme name="Office">
-      <a:majorFont>
-        <a:latin typeface="Arial"/>
-        <a:ea typeface=""/>
-        <a:cs typeface=""/>
-        <a:font script="Jpan" typeface="ＭＳ Ｐゴシック"/>
-        <a:font script="Hang" typeface="맑은 고딕"/>
-        <a:font script="Hans" typeface="宋体"/>
-        <a:font script="Hant" typeface="新細明體"/>
-        <a:font script="Arab" typeface="Times New Roman"/>
-        <a:font script="Hebr" typeface="Times New Roman"/>
-        <a:font script="Thai" typeface="Angsana New"/>
-        <a:font script="Ethi" typeface="Nyala"/>
-        <a:font script="Beng" typeface="Vrinda"/>
-        <a:font script="Gujr" typeface="Shruti"/>
-        <a:font script="Khmr" typeface="MoolBoran"/>
-        <a:font script="Knda" typeface="Tunga"/>
-        <a:font script="Guru" typeface="Raavi"/>
-        <a:font script="Cans" typeface="Euphemia"/>
-        <a:font script="Cher" typeface="Plantagenet Cherokee"/>
-        <a:font script="Yiii" typeface="Microsoft Yi Baiti"/>
-        <a:font script="Tibt" typeface="Microsoft Himalaya"/>
-        <a:font script="Thaa" typeface="MV Boli"/>
-        <a:font script="Deva" typeface="Mangal"/>
-        <a:font script="Telu" typeface="Gautami"/>
-        <a:font script="Taml" typeface="Latha"/>
-        <a:font script="Syrc" typeface="Estrangelo Edessa"/>
-        <a:font script="Orya" typeface="Kalinga"/>
-        <a:font script="Mlym" typeface="Kartika"/>
-        <a:font script="Laoo" typeface="DokChampa"/>
-        <a:font script="Sinh" typeface="Iskoola Pota"/>
-        <a:font script="Mong" typeface="Mongolian Baiti"/>
-        <a:font script="Viet" typeface="Times New Roman"/>
-        <a:font script="Uigh" typeface="Microsoft Uighur"/>
-        <a:font script="Geor" typeface="Sylfaen"/>
-      </a:majorFont>
-      <a:minorFont>
-        <a:latin typeface="Arial"/>
-        <a:ea typeface=""/>
-        <a:cs typeface=""/>
-        <a:font script="Jpan" typeface="ＭＳ Ｐゴシック"/>
-        <a:font script="Hang" typeface="맑은 고딕"/>
-        <a:font script="Hans" typeface="宋体"/>
-        <a:font script="Hant" typeface="新細明體"/>
-        <a:font script="Arab" typeface="Arial"/>
-        <a:font script="Hebr" typeface="Arial"/>
-        <a:font script="Thai" typeface="Cordia New"/>
-        <a:font script="Ethi" typeface="Nyala"/>
-        <a:font script="Beng" typeface="Vrinda"/>
-        <a:font script="Gujr" typeface="Shruti"/>
-        <a:font script="Khmr" typeface="DaunPenh"/>
-        <a:font script="Knda" typeface="Tunga"/>
-        <a:font script="Guru" typeface="Raavi"/>
-        <a:font script="Cans" typeface="Euphemia"/>
-        <a:font script="Cher" typeface="Plantagenet Cherokee"/>
-        <a:font script="Yiii" typeface="Microsoft Yi Baiti"/>
-        <a:font script="Tibt" typeface="Microsoft Himalaya"/>
-        <a:font script="Thaa" typeface="MV Boli"/>
-        <a:font script="Deva" typeface="Mangal"/>
-        <a:font script="Telu" typeface="Gautami"/>
-        <a:font script="Taml" typeface="Latha"/>
-        <a:font script="Syrc" typeface="Estrangelo Edessa"/>
-        <a:font script="Orya" typeface="Kalinga"/>
-        <a:font script="Mlym" typeface="Kartika"/>
-        <a:font script="Laoo" typeface="DokChampa"/>
-        <a:font script="Sinh" typeface="Iskoola Pota"/>
-        <a:font script="Mong" typeface="Mongolian Baiti"/>
-        <a:font script="Viet" typeface="Arial"/>
-        <a:font script="Uigh" typeface="Microsoft Uighur"/>
-        <a:font script="Geor" typeface="Sylfaen"/>
-      </a:minorFont>
-    </a:fontScheme>
-    <a:fmtScheme name="Office">
-      <a:fillStyleLst>
-        <a:solidFill>
-          <a:schemeClr val="phClr"/>
-        </a:solidFill>
-        <a:gradFill rotWithShape="1">
-          <a:gsLst>
-            <a:gs pos="0">
-              <a:schemeClr val="phClr">
-                <a:tint val="50000"/>
-                <a:satMod val="300000"/>
-              </a:schemeClr>
-            </a:gs>
-            <a:gs pos="35000">
-              <a:schemeClr val="phClr">
-                <a:tint val="37000"/>
-                <a:satMod val="300000"/>
-              </a:schemeClr>
-            </a:gs>
-            <a:gs pos="100000">
-              <a:schemeClr val="phClr">
-                <a:tint val="15000"/>
-                <a:satMod val="350000"/>
-              </a:schemeClr>
-            </a:gs>
-          </a:gsLst>
-          <a:lin ang="16200000" scaled="1"/>
-        </a:gradFill>
-        <a:gradFill rotWithShape="1">
-          <a:gsLst>
-            <a:gs pos="0">
-              <a:schemeClr val="phClr">
-                <a:tint val="100000"/>
-                <a:shade val="100000"/>
-                <a:satMod val="130000"/>
-              </a:schemeClr>
-            </a:gs>
-            <a:gs pos="100000">
-              <a:schemeClr val="phClr">
-                <a:tint val="50000"/>
-                <a:shade val="100000"/>
-                <a:satMod val="350000"/>
-              </a:schemeClr>
-            </a:gs>
-          </a:gsLst>
-          <a:lin ang="16200000" scaled="0"/>
-        </a:gradFill>
-      </a:fillStyleLst>
-      <a:lnStyleLst>
-        <a:ln w="9525" cap="flat" cmpd="sng" algn="ctr">
-          <a:solidFill>
-            <a:schemeClr val="phClr">
-              <a:shade val="95000"/>
-              <a:satMod val="105000"/>
-            </a:schemeClr>
-          </a:solidFill>
-          <a:prstDash val="solid"/>
-        </a:ln>
-        <a:ln w="25400" cap="flat" cmpd="sng" algn="ctr">
-          <a:solidFill>
-            <a:schemeClr val="phClr"/>
-          </a:solidFill>
-          <a:prstDash val="solid"/>
-        </a:ln>
-        <a:ln w="38100" cap="flat" cmpd="sng" algn="ctr">
-          <a:solidFill>
-            <a:schemeClr val="phClr"/>
-          </a:solidFill>
-          <a:prstDash val="solid"/>
-        </a:ln>
-      </a:lnStyleLst>
-      <a:effectStyleLst>
-        <a:effectStyle>
-          <a:effectLst>
-            <a:outerShdw blurRad="40000" dist="20000" dir="5400000" rotWithShape="0">
-              <a:srgbClr val="000000">
-                <a:alpha val="38000"/>
-              </a:srgbClr>
-            </a:outerShdw>
-          </a:effectLst>
-        </a:effectStyle>
-        <a:effectStyle>
-          <a:effectLst>
-            <a:outerShdw blurRad="40000" dist="23000" dir="5400000" rotWithShape="0">
-              <a:srgbClr val="000000">
-                <a:alpha val="35000"/>
-              </a:srgbClr>
-            </a:outerShdw>
-          </a:effectLst>
-        </a:effectStyle>
-        <a:effectStyle>
-          <a:effectLst>
-            <a:outerShdw blurRad="40000" dist="23000" dir="5400000" rotWithShape="0">
-              <a:srgbClr val="000000">
-                <a:alpha val="35000"/>
-              </a:srgbClr>
-            </a:outerShdw>
-          </a:effectLst>
-          <a:scene3d>
-            <a:camera prst="orthographicFront">
-              <a:rot lat="0" lon="0" rev="0"/>
-            </a:camera>
-            <a:lightRig rig="threePt" dir="t">
-              <a:rot lat="0" lon="0" rev="1200000"/>
-            </a:lightRig>
-          </a:scene3d>
-          <a:sp3d>
-            <a:bevelT w="63500" h="25400"/>
-          </a:sp3d>
-        </a:effectStyle>
-      </a:effectStyleLst>
-      <a:bgFillStyleLst>
-        <a:solidFill>
-          <a:schemeClr val="phClr"/>
-        </a:solidFill>
-        <a:gradFill rotWithShape="1">
-          <a:gsLst>
-            <a:gs pos="0">
-              <a:schemeClr val="phClr">
-                <a:tint val="40000"/>
-                <a:satMod val="350000"/>
-              </a:schemeClr>
-            </a:gs>
-            <a:gs pos="40000">
-              <a:schemeClr val="phClr">
-                <a:tint val="45000"/>
-                <a:shade val="99000"/>
-                <a:satMod val="350000"/>
-              </a:schemeClr>
-            </a:gs>
-            <a:gs pos="100000">
-              <a:schemeClr val="phClr">
-                <a:shade val="20000"/>
-                <a:satMod val="255000"/>
-              </a:schemeClr>
-            </a:gs>
-          </a:gsLst>
-          <a:path path="circle">
-            <a:fillToRect l="50000" t="-80000" r="50000" b="180000"/>
-          </a:path>
-        </a:gradFill>
-        <a:gradFill rotWithShape="1">
-          <a:gsLst>
-            <a:gs pos="0">
-              <a:schemeClr val="phClr">
-                <a:tint val="80000"/>
-                <a:satMod val="300000"/>
-              </a:schemeClr>
-            </a:gs>
-            <a:gs pos="100000">
-              <a:schemeClr val="phClr">
-                <a:shade val="30000"/>
-                <a:satMod val="200000"/>
-              </a:schemeClr>
-            </a:gs>
-          </a:gsLst>
-          <a:path path="circle">
-            <a:fillToRect l="50000" t="50000" r="50000" b="50000"/>
-          </a:path>
-        </a:gradFill>
-      </a:bgFillStyleLst>
-    </a:fmtScheme>
-  </a:themeElements>
-</a:theme>
 </file>
</xml_diff>